<commit_message>
lecture 1 slides uploaded
</commit_message>
<xml_diff>
--- a/lecture_slides/1_Introduction.pptx
+++ b/lecture_slides/1_Introduction.pptx
@@ -5,34 +5,33 @@
     <p:sldMasterId id="2147483756" r:id="rId1"/>
   </p:sldMasterIdLst>
   <p:notesMasterIdLst>
-    <p:notesMasterId r:id="rId27"/>
+    <p:notesMasterId r:id="rId26"/>
   </p:notesMasterIdLst>
   <p:sldIdLst>
     <p:sldId id="256" r:id="rId2"/>
-    <p:sldId id="263" r:id="rId3"/>
-    <p:sldId id="257" r:id="rId4"/>
-    <p:sldId id="259" r:id="rId5"/>
-    <p:sldId id="260" r:id="rId6"/>
-    <p:sldId id="261" r:id="rId7"/>
-    <p:sldId id="264" r:id="rId8"/>
-    <p:sldId id="267" r:id="rId9"/>
-    <p:sldId id="268" r:id="rId10"/>
-    <p:sldId id="269" r:id="rId11"/>
-    <p:sldId id="265" r:id="rId12"/>
-    <p:sldId id="266" r:id="rId13"/>
-    <p:sldId id="270" r:id="rId14"/>
-    <p:sldId id="272" r:id="rId15"/>
-    <p:sldId id="274" r:id="rId16"/>
-    <p:sldId id="275" r:id="rId17"/>
-    <p:sldId id="277" r:id="rId18"/>
-    <p:sldId id="276" r:id="rId19"/>
-    <p:sldId id="282" r:id="rId20"/>
-    <p:sldId id="278" r:id="rId21"/>
-    <p:sldId id="279" r:id="rId22"/>
-    <p:sldId id="280" r:id="rId23"/>
-    <p:sldId id="281" r:id="rId24"/>
-    <p:sldId id="283" r:id="rId25"/>
-    <p:sldId id="284" r:id="rId26"/>
+    <p:sldId id="257" r:id="rId3"/>
+    <p:sldId id="259" r:id="rId4"/>
+    <p:sldId id="260" r:id="rId5"/>
+    <p:sldId id="261" r:id="rId6"/>
+    <p:sldId id="264" r:id="rId7"/>
+    <p:sldId id="267" r:id="rId8"/>
+    <p:sldId id="268" r:id="rId9"/>
+    <p:sldId id="269" r:id="rId10"/>
+    <p:sldId id="265" r:id="rId11"/>
+    <p:sldId id="266" r:id="rId12"/>
+    <p:sldId id="270" r:id="rId13"/>
+    <p:sldId id="272" r:id="rId14"/>
+    <p:sldId id="274" r:id="rId15"/>
+    <p:sldId id="275" r:id="rId16"/>
+    <p:sldId id="277" r:id="rId17"/>
+    <p:sldId id="276" r:id="rId18"/>
+    <p:sldId id="282" r:id="rId19"/>
+    <p:sldId id="278" r:id="rId20"/>
+    <p:sldId id="279" r:id="rId21"/>
+    <p:sldId id="280" r:id="rId22"/>
+    <p:sldId id="281" r:id="rId23"/>
+    <p:sldId id="283" r:id="rId24"/>
+    <p:sldId id="284" r:id="rId25"/>
   </p:sldIdLst>
   <p:sldSz cx="12192000" cy="6858000"/>
   <p:notesSz cx="6858000" cy="9144000"/>
@@ -221,7 +220,7 @@
           <a:p>
             <a:fld id="{5FAD3E5C-F930-41FF-A7BD-4F17EC525029}" type="datetimeFigureOut">
               <a:rPr lang="en-US" smtClean="0"/>
-              <a:t>1/5/2020</a:t>
+              <a:t>1/6/2020</a:t>
             </a:fld>
             <a:endParaRPr lang="en-US"/>
           </a:p>
@@ -554,7 +553,7 @@
           <a:p>
             <a:fld id="{C26E7B1E-ABB1-46B6-B8A6-8D4F0CECF6C4}" type="slidenum">
               <a:rPr lang="en-US" smtClean="0"/>
-              <a:t>11</a:t>
+              <a:t>10</a:t>
             </a:fld>
             <a:endParaRPr lang="en-US"/>
           </a:p>
@@ -638,7 +637,7 @@
           <a:p>
             <a:fld id="{C26E7B1E-ABB1-46B6-B8A6-8D4F0CECF6C4}" type="slidenum">
               <a:rPr lang="en-US" smtClean="0"/>
-              <a:t>15</a:t>
+              <a:t>14</a:t>
             </a:fld>
             <a:endParaRPr lang="en-US"/>
           </a:p>
@@ -722,7 +721,7 @@
           <a:p>
             <a:fld id="{C26E7B1E-ABB1-46B6-B8A6-8D4F0CECF6C4}" type="slidenum">
               <a:rPr lang="en-US" smtClean="0"/>
-              <a:t>24</a:t>
+              <a:t>23</a:t>
             </a:fld>
             <a:endParaRPr lang="en-US"/>
           </a:p>
@@ -947,7 +946,7 @@
           <a:p>
             <a:fld id="{CF755E22-BC43-4D49-9578-DDCD8AECFE11}" type="datetime1">
               <a:rPr lang="en-US" smtClean="0"/>
-              <a:t>1/5/2020</a:t>
+              <a:t>1/6/2020</a:t>
             </a:fld>
             <a:endParaRPr lang="en-US"/>
           </a:p>
@@ -1140,7 +1139,7 @@
           <a:p>
             <a:fld id="{0794BCA7-61FF-4C69-83B4-1EE7F9C38FAE}" type="datetime1">
               <a:rPr lang="en-US" smtClean="0"/>
-              <a:t>1/5/2020</a:t>
+              <a:t>1/6/2020</a:t>
             </a:fld>
             <a:endParaRPr lang="en-US"/>
           </a:p>
@@ -1320,7 +1319,7 @@
           <a:p>
             <a:fld id="{2F426122-0BE0-446C-A2FF-4796182DFFAC}" type="datetime1">
               <a:rPr lang="en-US" smtClean="0"/>
-              <a:t>1/5/2020</a:t>
+              <a:t>1/6/2020</a:t>
             </a:fld>
             <a:endParaRPr lang="en-US"/>
           </a:p>
@@ -1502,7 +1501,7 @@
           <a:p>
             <a:fld id="{04327D2D-9EC0-4F31-85D2-F4C48BAC2F55}" type="datetime1">
               <a:rPr lang="en-US" smtClean="0"/>
-              <a:t>1/5/2020</a:t>
+              <a:t>1/6/2020</a:t>
             </a:fld>
             <a:endParaRPr lang="en-US"/>
           </a:p>
@@ -1760,7 +1759,7 @@
           <a:p>
             <a:fld id="{384E5460-7712-4DAC-A337-BB4CDDFDE11E}" type="datetime1">
               <a:rPr lang="en-US" smtClean="0"/>
-              <a:t>1/5/2020</a:t>
+              <a:t>1/6/2020</a:t>
             </a:fld>
             <a:endParaRPr lang="en-US"/>
           </a:p>
@@ -2108,7 +2107,7 @@
           <a:p>
             <a:fld id="{B6D96965-36E5-4BBA-B60B-6A05499492A8}" type="datetime1">
               <a:rPr lang="en-US" smtClean="0"/>
-              <a:t>1/5/2020</a:t>
+              <a:t>1/6/2020</a:t>
             </a:fld>
             <a:endParaRPr lang="en-US"/>
           </a:p>
@@ -2552,7 +2551,7 @@
           <a:p>
             <a:fld id="{E5FF4975-A1F7-4E83-8D89-D5C6A414E393}" type="datetime1">
               <a:rPr lang="en-US" smtClean="0"/>
-              <a:t>1/5/2020</a:t>
+              <a:t>1/6/2020</a:t>
             </a:fld>
             <a:endParaRPr lang="en-US"/>
           </a:p>
@@ -2670,7 +2669,7 @@
           <a:p>
             <a:fld id="{A743C323-1D9C-4347-AB6E-A56B8A43D30E}" type="datetime1">
               <a:rPr lang="en-US" smtClean="0"/>
-              <a:t>1/5/2020</a:t>
+              <a:t>1/6/2020</a:t>
             </a:fld>
             <a:endParaRPr lang="en-US"/>
           </a:p>
@@ -2765,7 +2764,7 @@
           <a:p>
             <a:fld id="{14A699DA-48FF-4F63-A1AD-D752E11C195D}" type="datetime1">
               <a:rPr lang="en-US" smtClean="0"/>
-              <a:t>1/5/2020</a:t>
+              <a:t>1/6/2020</a:t>
             </a:fld>
             <a:endParaRPr lang="en-US"/>
           </a:p>
@@ -3124,7 +3123,7 @@
           <a:p>
             <a:fld id="{13DBFBEF-2B7E-4BA9-A9F8-30DFE087F6D3}" type="datetime1">
               <a:rPr lang="en-US" smtClean="0"/>
-              <a:t>1/5/2020</a:t>
+              <a:t>1/6/2020</a:t>
             </a:fld>
             <a:endParaRPr lang="en-US"/>
           </a:p>
@@ -3440,7 +3439,7 @@
           <a:p>
             <a:fld id="{2CBB7AE7-2826-4915-A6AD-CDE2CB158F62}" type="datetime1">
               <a:rPr lang="en-US" smtClean="0"/>
-              <a:t>1/5/2020</a:t>
+              <a:t>1/6/2020</a:t>
             </a:fld>
             <a:endParaRPr lang="en-US"/>
           </a:p>
@@ -3673,7 +3672,7 @@
           <a:p>
             <a:fld id="{B8DB072C-F5A4-4FFF-AAE2-73A8228D61CF}" type="datetime1">
               <a:rPr lang="en-US" smtClean="0"/>
-              <a:t>1/5/2020</a:t>
+              <a:t>1/6/2020</a:t>
             </a:fld>
             <a:endParaRPr lang="en-US"/>
           </a:p>
@@ -4386,7 +4385,7 @@
           <a:p>
             <a:r>
               <a:rPr lang="en-IN" dirty="0" smtClean="0"/>
-              <a:t>Mini-projects (assignments) – 30%</a:t>
+              <a:t>Reference Material</a:t>
             </a:r>
             <a:endParaRPr lang="en-IN" dirty="0"/>
           </a:p>
@@ -4402,12 +4401,7 @@
             <p:ph idx="1"/>
           </p:nvPr>
         </p:nvSpPr>
-        <p:spPr>
-          <a:xfrm>
-            <a:off x="253354" y="1111624"/>
-            <a:ext cx="11600328" cy="5746376"/>
-          </a:xfrm>
-        </p:spPr>
+        <p:spPr/>
         <p:txBody>
           <a:bodyPr>
             <a:normAutofit/>
@@ -4416,84 +4410,77 @@
           <a:p>
             <a:r>
               <a:rPr lang="en-IN" dirty="0" smtClean="0"/>
-              <a:t>Three (3) mini projects to be done (weightages to be decided)</a:t>
-            </a:r>
+              <a:t>No single textbook for the course</a:t>
+            </a:r>
+          </a:p>
+          <a:p>
+            <a:r>
+              <a:rPr lang="en-IN" dirty="0" smtClean="0"/>
+              <a:t>Lecture slides, course notes will be uploaded onto course website</a:t>
+            </a:r>
+          </a:p>
+          <a:p>
+            <a:r>
+              <a:rPr lang="en-IN" dirty="0" smtClean="0"/>
+              <a:t>List of reference </a:t>
+            </a:r>
+            <a:r>
+              <a:rPr lang="en-IN" dirty="0" smtClean="0"/>
+              <a:t>material is already up on </a:t>
+            </a:r>
+            <a:r>
+              <a:rPr lang="en-IN" dirty="0" smtClean="0"/>
+              <a:t>course website</a:t>
+            </a:r>
+            <a:endParaRPr lang="en-IN" dirty="0" smtClean="0"/>
+          </a:p>
+          <a:p>
+            <a:r>
+              <a:rPr lang="en-IN" dirty="0" smtClean="0"/>
+              <a:t>Python Resources: several available – choose your favourite</a:t>
+            </a:r>
+            <a:endParaRPr lang="en-IN" dirty="0"/>
           </a:p>
           <a:p>
             <a:pPr lvl="1"/>
             <a:r>
-              <a:rPr lang="en-IN" dirty="0" smtClean="0"/>
-              <a:t>Replaces the single monolith project in previous offerings of CS771</a:t>
-            </a:r>
+              <a:rPr lang="en-IN" dirty="0" smtClean="0">
+                <a:hlinkClick r:id="rId3"/>
+              </a:rPr>
+              <a:t>www.geeksforgeeks.org/python-programming-language/</a:t>
+            </a:r>
+            <a:endParaRPr lang="en-IN" dirty="0" smtClean="0"/>
           </a:p>
           <a:p>
             <a:r>
+              <a:rPr lang="en-IN" dirty="0" err="1" smtClean="0"/>
+              <a:t>LaTeX</a:t>
+            </a:r>
+            <a:r>
               <a:rPr lang="en-IN" dirty="0" smtClean="0"/>
-              <a:t>Mini-projects to be done in groups of five (5) students each</a:t>
-            </a:r>
-          </a:p>
-          <a:p>
-            <a:r>
-              <a:rPr lang="en-IN" dirty="0" smtClean="0"/>
-              <a:t>Start forming your group today</a:t>
-            </a:r>
+              <a:t> resources: several available – choose your favourite</a:t>
+            </a:r>
+            <a:endParaRPr lang="en-IN" dirty="0"/>
           </a:p>
           <a:p>
             <a:pPr lvl="1"/>
             <a:r>
-              <a:rPr lang="en-IN" dirty="0" smtClean="0"/>
-              <a:t>Will ask you to submit group details once add-drop is over</a:t>
-            </a:r>
+              <a:rPr lang="en-IN" dirty="0" smtClean="0">
+                <a:hlinkClick r:id="rId4"/>
+              </a:rPr>
+              <a:t>www.sharelatex.com/blog/latex-guides/beginners-tutorial.html</a:t>
+            </a:r>
+            <a:endParaRPr lang="en-IN" dirty="0" smtClean="0"/>
           </a:p>
           <a:p>
             <a:pPr lvl="1"/>
             <a:r>
-              <a:rPr lang="en-IN" dirty="0" smtClean="0"/>
-              <a:t>Groups can only contain registered students (no auditors)</a:t>
-            </a:r>
-          </a:p>
-          <a:p>
-            <a:r>
-              <a:rPr lang="en-IN" dirty="0" smtClean="0"/>
-              <a:t>Will have 1-2 weeks to finish each mini-project</a:t>
-            </a:r>
-          </a:p>
-          <a:p>
-            <a:r>
-              <a:rPr lang="en-IN" dirty="0" smtClean="0"/>
-              <a:t>Submission will include code + report</a:t>
-            </a:r>
-          </a:p>
-          <a:p>
-            <a:r>
-              <a:rPr lang="en-IN" dirty="0" smtClean="0"/>
-              <a:t>Code should be in Python – start learning Python today</a:t>
-            </a:r>
-          </a:p>
-          <a:p>
-            <a:r>
-              <a:rPr lang="en-IN" dirty="0" smtClean="0"/>
-              <a:t>Report must be in </a:t>
-            </a:r>
-            <a:r>
-              <a:rPr lang="en-IN" dirty="0" err="1" smtClean="0"/>
-              <a:t>LaTeX</a:t>
-            </a:r>
-            <a:r>
-              <a:rPr lang="en-IN" dirty="0" smtClean="0"/>
-              <a:t> – start learning </a:t>
-            </a:r>
-            <a:r>
-              <a:rPr lang="en-IN" dirty="0" err="1" smtClean="0"/>
-              <a:t>LaTeX</a:t>
-            </a:r>
-            <a:r>
-              <a:rPr lang="en-IN" dirty="0" smtClean="0"/>
-              <a:t> today</a:t>
-            </a:r>
-          </a:p>
-          <a:p>
-            <a:endParaRPr lang="en-IN" dirty="0"/>
+              <a:rPr lang="en-IN" dirty="0" smtClean="0">
+                <a:hlinkClick r:id="rId5"/>
+              </a:rPr>
+              <a:t>www.overleaf.com/learn/latex/Tutorials</a:t>
+            </a:r>
+            <a:endParaRPr lang="en-IN" dirty="0" smtClean="0"/>
           </a:p>
         </p:txBody>
       </p:sp>
@@ -4515,641 +4502,6 @@
             <a:fld id="{157B8E69-23A9-4619-9CFE-E27BFD8A78F9}" type="slidenum">
               <a:rPr lang="en-US" smtClean="0"/>
               <a:t>10</a:t>
-            </a:fld>
-            <a:endParaRPr lang="en-US"/>
-          </a:p>
-        </p:txBody>
-      </p:sp>
-    </p:spTree>
-    <p:extLst>
-      <p:ext uri="{BB962C8B-B14F-4D97-AF65-F5344CB8AC3E}">
-        <p14:creationId xmlns:p14="http://schemas.microsoft.com/office/powerpoint/2010/main" val="1385677891"/>
-      </p:ext>
-    </p:extLst>
-  </p:cSld>
-  <p:clrMapOvr>
-    <a:masterClrMapping/>
-  </p:clrMapOvr>
-  <p:timing>
-    <p:tnLst>
-      <p:par>
-        <p:cTn id="1" dur="indefinite" restart="never" nodeType="tmRoot">
-          <p:childTnLst>
-            <p:seq concurrent="1" nextAc="seek">
-              <p:cTn id="2" dur="indefinite" nodeType="mainSeq">
-                <p:childTnLst>
-                  <p:par>
-                    <p:cTn id="3" fill="hold">
-                      <p:stCondLst>
-                        <p:cond delay="indefinite"/>
-                      </p:stCondLst>
-                      <p:childTnLst>
-                        <p:par>
-                          <p:cTn id="4" fill="hold">
-                            <p:stCondLst>
-                              <p:cond delay="0"/>
-                            </p:stCondLst>
-                            <p:childTnLst>
-                              <p:par>
-                                <p:cTn id="5" presetID="1" presetClass="entr" presetSubtype="0" fill="hold" grpId="0" nodeType="clickEffect">
-                                  <p:stCondLst>
-                                    <p:cond delay="0"/>
-                                  </p:stCondLst>
-                                  <p:childTnLst>
-                                    <p:set>
-                                      <p:cBhvr>
-                                        <p:cTn id="6" dur="1" fill="hold">
-                                          <p:stCondLst>
-                                            <p:cond delay="0"/>
-                                          </p:stCondLst>
-                                        </p:cTn>
-                                        <p:tgtEl>
-                                          <p:spTgt spid="3">
-                                            <p:txEl>
-                                              <p:pRg st="0" end="0"/>
-                                            </p:txEl>
-                                          </p:spTgt>
-                                        </p:tgtEl>
-                                        <p:attrNameLst>
-                                          <p:attrName>style.visibility</p:attrName>
-                                        </p:attrNameLst>
-                                      </p:cBhvr>
-                                      <p:to>
-                                        <p:strVal val="visible"/>
-                                      </p:to>
-                                    </p:set>
-                                  </p:childTnLst>
-                                </p:cTn>
-                              </p:par>
-                              <p:par>
-                                <p:cTn id="7" presetID="1" presetClass="entr" presetSubtype="0" fill="hold" grpId="0" nodeType="withEffect">
-                                  <p:stCondLst>
-                                    <p:cond delay="0"/>
-                                  </p:stCondLst>
-                                  <p:childTnLst>
-                                    <p:set>
-                                      <p:cBhvr>
-                                        <p:cTn id="8" dur="1" fill="hold">
-                                          <p:stCondLst>
-                                            <p:cond delay="0"/>
-                                          </p:stCondLst>
-                                        </p:cTn>
-                                        <p:tgtEl>
-                                          <p:spTgt spid="3">
-                                            <p:txEl>
-                                              <p:pRg st="1" end="1"/>
-                                            </p:txEl>
-                                          </p:spTgt>
-                                        </p:tgtEl>
-                                        <p:attrNameLst>
-                                          <p:attrName>style.visibility</p:attrName>
-                                        </p:attrNameLst>
-                                      </p:cBhvr>
-                                      <p:to>
-                                        <p:strVal val="visible"/>
-                                      </p:to>
-                                    </p:set>
-                                  </p:childTnLst>
-                                </p:cTn>
-                              </p:par>
-                            </p:childTnLst>
-                          </p:cTn>
-                        </p:par>
-                      </p:childTnLst>
-                    </p:cTn>
-                  </p:par>
-                  <p:par>
-                    <p:cTn id="9" fill="hold">
-                      <p:stCondLst>
-                        <p:cond delay="indefinite"/>
-                      </p:stCondLst>
-                      <p:childTnLst>
-                        <p:par>
-                          <p:cTn id="10" fill="hold">
-                            <p:stCondLst>
-                              <p:cond delay="0"/>
-                            </p:stCondLst>
-                            <p:childTnLst>
-                              <p:par>
-                                <p:cTn id="11" presetID="1" presetClass="entr" presetSubtype="0" fill="hold" grpId="0" nodeType="clickEffect">
-                                  <p:stCondLst>
-                                    <p:cond delay="0"/>
-                                  </p:stCondLst>
-                                  <p:childTnLst>
-                                    <p:set>
-                                      <p:cBhvr>
-                                        <p:cTn id="12" dur="1" fill="hold">
-                                          <p:stCondLst>
-                                            <p:cond delay="0"/>
-                                          </p:stCondLst>
-                                        </p:cTn>
-                                        <p:tgtEl>
-                                          <p:spTgt spid="3">
-                                            <p:txEl>
-                                              <p:pRg st="2" end="2"/>
-                                            </p:txEl>
-                                          </p:spTgt>
-                                        </p:tgtEl>
-                                        <p:attrNameLst>
-                                          <p:attrName>style.visibility</p:attrName>
-                                        </p:attrNameLst>
-                                      </p:cBhvr>
-                                      <p:to>
-                                        <p:strVal val="visible"/>
-                                      </p:to>
-                                    </p:set>
-                                  </p:childTnLst>
-                                </p:cTn>
-                              </p:par>
-                            </p:childTnLst>
-                          </p:cTn>
-                        </p:par>
-                      </p:childTnLst>
-                    </p:cTn>
-                  </p:par>
-                  <p:par>
-                    <p:cTn id="13" fill="hold">
-                      <p:stCondLst>
-                        <p:cond delay="indefinite"/>
-                      </p:stCondLst>
-                      <p:childTnLst>
-                        <p:par>
-                          <p:cTn id="14" fill="hold">
-                            <p:stCondLst>
-                              <p:cond delay="0"/>
-                            </p:stCondLst>
-                            <p:childTnLst>
-                              <p:par>
-                                <p:cTn id="15" presetID="1" presetClass="entr" presetSubtype="0" fill="hold" grpId="0" nodeType="clickEffect">
-                                  <p:stCondLst>
-                                    <p:cond delay="0"/>
-                                  </p:stCondLst>
-                                  <p:childTnLst>
-                                    <p:set>
-                                      <p:cBhvr>
-                                        <p:cTn id="16" dur="1" fill="hold">
-                                          <p:stCondLst>
-                                            <p:cond delay="0"/>
-                                          </p:stCondLst>
-                                        </p:cTn>
-                                        <p:tgtEl>
-                                          <p:spTgt spid="3">
-                                            <p:txEl>
-                                              <p:pRg st="3" end="3"/>
-                                            </p:txEl>
-                                          </p:spTgt>
-                                        </p:tgtEl>
-                                        <p:attrNameLst>
-                                          <p:attrName>style.visibility</p:attrName>
-                                        </p:attrNameLst>
-                                      </p:cBhvr>
-                                      <p:to>
-                                        <p:strVal val="visible"/>
-                                      </p:to>
-                                    </p:set>
-                                  </p:childTnLst>
-                                </p:cTn>
-                              </p:par>
-                              <p:par>
-                                <p:cTn id="17" presetID="1" presetClass="entr" presetSubtype="0" fill="hold" grpId="0" nodeType="withEffect">
-                                  <p:stCondLst>
-                                    <p:cond delay="0"/>
-                                  </p:stCondLst>
-                                  <p:childTnLst>
-                                    <p:set>
-                                      <p:cBhvr>
-                                        <p:cTn id="18" dur="1" fill="hold">
-                                          <p:stCondLst>
-                                            <p:cond delay="0"/>
-                                          </p:stCondLst>
-                                        </p:cTn>
-                                        <p:tgtEl>
-                                          <p:spTgt spid="3">
-                                            <p:txEl>
-                                              <p:pRg st="4" end="4"/>
-                                            </p:txEl>
-                                          </p:spTgt>
-                                        </p:tgtEl>
-                                        <p:attrNameLst>
-                                          <p:attrName>style.visibility</p:attrName>
-                                        </p:attrNameLst>
-                                      </p:cBhvr>
-                                      <p:to>
-                                        <p:strVal val="visible"/>
-                                      </p:to>
-                                    </p:set>
-                                  </p:childTnLst>
-                                </p:cTn>
-                              </p:par>
-                              <p:par>
-                                <p:cTn id="19" presetID="1" presetClass="entr" presetSubtype="0" fill="hold" grpId="0" nodeType="withEffect">
-                                  <p:stCondLst>
-                                    <p:cond delay="0"/>
-                                  </p:stCondLst>
-                                  <p:childTnLst>
-                                    <p:set>
-                                      <p:cBhvr>
-                                        <p:cTn id="20" dur="1" fill="hold">
-                                          <p:stCondLst>
-                                            <p:cond delay="0"/>
-                                          </p:stCondLst>
-                                        </p:cTn>
-                                        <p:tgtEl>
-                                          <p:spTgt spid="3">
-                                            <p:txEl>
-                                              <p:pRg st="5" end="5"/>
-                                            </p:txEl>
-                                          </p:spTgt>
-                                        </p:tgtEl>
-                                        <p:attrNameLst>
-                                          <p:attrName>style.visibility</p:attrName>
-                                        </p:attrNameLst>
-                                      </p:cBhvr>
-                                      <p:to>
-                                        <p:strVal val="visible"/>
-                                      </p:to>
-                                    </p:set>
-                                  </p:childTnLst>
-                                </p:cTn>
-                              </p:par>
-                            </p:childTnLst>
-                          </p:cTn>
-                        </p:par>
-                      </p:childTnLst>
-                    </p:cTn>
-                  </p:par>
-                  <p:par>
-                    <p:cTn id="21" fill="hold">
-                      <p:stCondLst>
-                        <p:cond delay="indefinite"/>
-                      </p:stCondLst>
-                      <p:childTnLst>
-                        <p:par>
-                          <p:cTn id="22" fill="hold">
-                            <p:stCondLst>
-                              <p:cond delay="0"/>
-                            </p:stCondLst>
-                            <p:childTnLst>
-                              <p:par>
-                                <p:cTn id="23" presetID="1" presetClass="entr" presetSubtype="0" fill="hold" grpId="0" nodeType="clickEffect">
-                                  <p:stCondLst>
-                                    <p:cond delay="0"/>
-                                  </p:stCondLst>
-                                  <p:childTnLst>
-                                    <p:set>
-                                      <p:cBhvr>
-                                        <p:cTn id="24" dur="1" fill="hold">
-                                          <p:stCondLst>
-                                            <p:cond delay="0"/>
-                                          </p:stCondLst>
-                                        </p:cTn>
-                                        <p:tgtEl>
-                                          <p:spTgt spid="3">
-                                            <p:txEl>
-                                              <p:pRg st="6" end="6"/>
-                                            </p:txEl>
-                                          </p:spTgt>
-                                        </p:tgtEl>
-                                        <p:attrNameLst>
-                                          <p:attrName>style.visibility</p:attrName>
-                                        </p:attrNameLst>
-                                      </p:cBhvr>
-                                      <p:to>
-                                        <p:strVal val="visible"/>
-                                      </p:to>
-                                    </p:set>
-                                  </p:childTnLst>
-                                </p:cTn>
-                              </p:par>
-                            </p:childTnLst>
-                          </p:cTn>
-                        </p:par>
-                      </p:childTnLst>
-                    </p:cTn>
-                  </p:par>
-                  <p:par>
-                    <p:cTn id="25" fill="hold">
-                      <p:stCondLst>
-                        <p:cond delay="indefinite"/>
-                      </p:stCondLst>
-                      <p:childTnLst>
-                        <p:par>
-                          <p:cTn id="26" fill="hold">
-                            <p:stCondLst>
-                              <p:cond delay="0"/>
-                            </p:stCondLst>
-                            <p:childTnLst>
-                              <p:par>
-                                <p:cTn id="27" presetID="1" presetClass="entr" presetSubtype="0" fill="hold" grpId="0" nodeType="clickEffect">
-                                  <p:stCondLst>
-                                    <p:cond delay="0"/>
-                                  </p:stCondLst>
-                                  <p:childTnLst>
-                                    <p:set>
-                                      <p:cBhvr>
-                                        <p:cTn id="28" dur="1" fill="hold">
-                                          <p:stCondLst>
-                                            <p:cond delay="0"/>
-                                          </p:stCondLst>
-                                        </p:cTn>
-                                        <p:tgtEl>
-                                          <p:spTgt spid="3">
-                                            <p:txEl>
-                                              <p:pRg st="7" end="7"/>
-                                            </p:txEl>
-                                          </p:spTgt>
-                                        </p:tgtEl>
-                                        <p:attrNameLst>
-                                          <p:attrName>style.visibility</p:attrName>
-                                        </p:attrNameLst>
-                                      </p:cBhvr>
-                                      <p:to>
-                                        <p:strVal val="visible"/>
-                                      </p:to>
-                                    </p:set>
-                                  </p:childTnLst>
-                                </p:cTn>
-                              </p:par>
-                            </p:childTnLst>
-                          </p:cTn>
-                        </p:par>
-                      </p:childTnLst>
-                    </p:cTn>
-                  </p:par>
-                  <p:par>
-                    <p:cTn id="29" fill="hold">
-                      <p:stCondLst>
-                        <p:cond delay="indefinite"/>
-                      </p:stCondLst>
-                      <p:childTnLst>
-                        <p:par>
-                          <p:cTn id="30" fill="hold">
-                            <p:stCondLst>
-                              <p:cond delay="0"/>
-                            </p:stCondLst>
-                            <p:childTnLst>
-                              <p:par>
-                                <p:cTn id="31" presetID="1" presetClass="entr" presetSubtype="0" fill="hold" grpId="0" nodeType="clickEffect">
-                                  <p:stCondLst>
-                                    <p:cond delay="0"/>
-                                  </p:stCondLst>
-                                  <p:childTnLst>
-                                    <p:set>
-                                      <p:cBhvr>
-                                        <p:cTn id="32" dur="1" fill="hold">
-                                          <p:stCondLst>
-                                            <p:cond delay="0"/>
-                                          </p:stCondLst>
-                                        </p:cTn>
-                                        <p:tgtEl>
-                                          <p:spTgt spid="3">
-                                            <p:txEl>
-                                              <p:pRg st="8" end="8"/>
-                                            </p:txEl>
-                                          </p:spTgt>
-                                        </p:tgtEl>
-                                        <p:attrNameLst>
-                                          <p:attrName>style.visibility</p:attrName>
-                                        </p:attrNameLst>
-                                      </p:cBhvr>
-                                      <p:to>
-                                        <p:strVal val="visible"/>
-                                      </p:to>
-                                    </p:set>
-                                  </p:childTnLst>
-                                </p:cTn>
-                              </p:par>
-                            </p:childTnLst>
-                          </p:cTn>
-                        </p:par>
-                      </p:childTnLst>
-                    </p:cTn>
-                  </p:par>
-                  <p:par>
-                    <p:cTn id="33" fill="hold">
-                      <p:stCondLst>
-                        <p:cond delay="indefinite"/>
-                      </p:stCondLst>
-                      <p:childTnLst>
-                        <p:par>
-                          <p:cTn id="34" fill="hold">
-                            <p:stCondLst>
-                              <p:cond delay="0"/>
-                            </p:stCondLst>
-                            <p:childTnLst>
-                              <p:par>
-                                <p:cTn id="35" presetID="1" presetClass="entr" presetSubtype="0" fill="hold" grpId="0" nodeType="clickEffect">
-                                  <p:stCondLst>
-                                    <p:cond delay="0"/>
-                                  </p:stCondLst>
-                                  <p:childTnLst>
-                                    <p:set>
-                                      <p:cBhvr>
-                                        <p:cTn id="36" dur="1" fill="hold">
-                                          <p:stCondLst>
-                                            <p:cond delay="0"/>
-                                          </p:stCondLst>
-                                        </p:cTn>
-                                        <p:tgtEl>
-                                          <p:spTgt spid="3">
-                                            <p:txEl>
-                                              <p:pRg st="9" end="9"/>
-                                            </p:txEl>
-                                          </p:spTgt>
-                                        </p:tgtEl>
-                                        <p:attrNameLst>
-                                          <p:attrName>style.visibility</p:attrName>
-                                        </p:attrNameLst>
-                                      </p:cBhvr>
-                                      <p:to>
-                                        <p:strVal val="visible"/>
-                                      </p:to>
-                                    </p:set>
-                                  </p:childTnLst>
-                                </p:cTn>
-                              </p:par>
-                            </p:childTnLst>
-                          </p:cTn>
-                        </p:par>
-                      </p:childTnLst>
-                    </p:cTn>
-                  </p:par>
-                </p:childTnLst>
-              </p:cTn>
-              <p:prevCondLst>
-                <p:cond evt="onPrev" delay="0">
-                  <p:tgtEl>
-                    <p:sldTgt/>
-                  </p:tgtEl>
-                </p:cond>
-              </p:prevCondLst>
-              <p:nextCondLst>
-                <p:cond evt="onNext" delay="0">
-                  <p:tgtEl>
-                    <p:sldTgt/>
-                  </p:tgtEl>
-                </p:cond>
-              </p:nextCondLst>
-            </p:seq>
-          </p:childTnLst>
-        </p:cTn>
-      </p:par>
-    </p:tnLst>
-    <p:bldLst>
-      <p:bldP spid="3" grpId="0" build="p"/>
-    </p:bldLst>
-  </p:timing>
-</p:sld>
-</file>
-
-<file path=ppt/slides/slide11.xml><?xml version="1.0" encoding="utf-8"?>
-<p:sld xmlns:a="http://schemas.openxmlformats.org/drawingml/2006/main" xmlns:r="http://schemas.openxmlformats.org/officeDocument/2006/relationships" xmlns:p="http://schemas.openxmlformats.org/presentationml/2006/main">
-  <p:cSld>
-    <p:spTree>
-      <p:nvGrpSpPr>
-        <p:cNvPr id="1" name=""/>
-        <p:cNvGrpSpPr/>
-        <p:nvPr/>
-      </p:nvGrpSpPr>
-      <p:grpSpPr>
-        <a:xfrm>
-          <a:off x="0" y="0"/>
-          <a:ext cx="0" cy="0"/>
-          <a:chOff x="0" y="0"/>
-          <a:chExt cx="0" cy="0"/>
-        </a:xfrm>
-      </p:grpSpPr>
-      <p:sp>
-        <p:nvSpPr>
-          <p:cNvPr id="2" name="Title 1"/>
-          <p:cNvSpPr>
-            <a:spLocks noGrp="1"/>
-          </p:cNvSpPr>
-          <p:nvPr>
-            <p:ph type="title"/>
-          </p:nvPr>
-        </p:nvSpPr>
-        <p:spPr/>
-        <p:txBody>
-          <a:bodyPr/>
-          <a:lstStyle/>
-          <a:p>
-            <a:r>
-              <a:rPr lang="en-IN" dirty="0" smtClean="0"/>
-              <a:t>Reference Material</a:t>
-            </a:r>
-            <a:endParaRPr lang="en-IN" dirty="0"/>
-          </a:p>
-        </p:txBody>
-      </p:sp>
-      <p:sp>
-        <p:nvSpPr>
-          <p:cNvPr id="3" name="Content Placeholder 2"/>
-          <p:cNvSpPr>
-            <a:spLocks noGrp="1"/>
-          </p:cNvSpPr>
-          <p:nvPr>
-            <p:ph idx="1"/>
-          </p:nvPr>
-        </p:nvSpPr>
-        <p:spPr/>
-        <p:txBody>
-          <a:bodyPr>
-            <a:normAutofit/>
-          </a:bodyPr>
-          <a:lstStyle/>
-          <a:p>
-            <a:r>
-              <a:rPr lang="en-IN" dirty="0" smtClean="0"/>
-              <a:t>No single textbook for the course</a:t>
-            </a:r>
-          </a:p>
-          <a:p>
-            <a:r>
-              <a:rPr lang="en-IN" dirty="0" smtClean="0"/>
-              <a:t>Lecture slides, course notes will be uploaded onto course website</a:t>
-            </a:r>
-          </a:p>
-          <a:p>
-            <a:r>
-              <a:rPr lang="en-IN" dirty="0" smtClean="0"/>
-              <a:t>Reference material is already up on course material</a:t>
-            </a:r>
-          </a:p>
-          <a:p>
-            <a:r>
-              <a:rPr lang="en-IN" dirty="0" smtClean="0"/>
-              <a:t>Locally cached copies for some textbooks also available</a:t>
-            </a:r>
-          </a:p>
-          <a:p>
-            <a:r>
-              <a:rPr lang="en-IN" dirty="0" smtClean="0"/>
-              <a:t>Python Resources: several available – choose your favourite</a:t>
-            </a:r>
-            <a:endParaRPr lang="en-IN" dirty="0"/>
-          </a:p>
-          <a:p>
-            <a:pPr lvl="1"/>
-            <a:r>
-              <a:rPr lang="en-IN" dirty="0" smtClean="0">
-                <a:hlinkClick r:id="rId3"/>
-              </a:rPr>
-              <a:t>www.geeksforgeeks.org/python-programming-language/</a:t>
-            </a:r>
-            <a:endParaRPr lang="en-IN" dirty="0" smtClean="0"/>
-          </a:p>
-          <a:p>
-            <a:r>
-              <a:rPr lang="en-IN" dirty="0" err="1" smtClean="0"/>
-              <a:t>LaTeX</a:t>
-            </a:r>
-            <a:r>
-              <a:rPr lang="en-IN" dirty="0" smtClean="0"/>
-              <a:t> resources: several available – choose your favourite</a:t>
-            </a:r>
-            <a:endParaRPr lang="en-IN" dirty="0"/>
-          </a:p>
-          <a:p>
-            <a:pPr lvl="1"/>
-            <a:r>
-              <a:rPr lang="en-IN" dirty="0" smtClean="0">
-                <a:hlinkClick r:id="rId4"/>
-              </a:rPr>
-              <a:t>www.sharelatex.com/blog/latex-guides/beginners-tutorial.html</a:t>
-            </a:r>
-            <a:endParaRPr lang="en-IN" dirty="0" smtClean="0"/>
-          </a:p>
-          <a:p>
-            <a:pPr lvl="1"/>
-            <a:r>
-              <a:rPr lang="en-IN" dirty="0" smtClean="0">
-                <a:hlinkClick r:id="rId5"/>
-              </a:rPr>
-              <a:t>www.overleaf.com/learn/latex/Tutorials</a:t>
-            </a:r>
-            <a:endParaRPr lang="en-IN" dirty="0" smtClean="0"/>
-          </a:p>
-        </p:txBody>
-      </p:sp>
-      <p:sp>
-        <p:nvSpPr>
-          <p:cNvPr id="4" name="Slide Number Placeholder 3"/>
-          <p:cNvSpPr>
-            <a:spLocks noGrp="1"/>
-          </p:cNvSpPr>
-          <p:nvPr>
-            <p:ph type="sldNum" sz="quarter" idx="12"/>
-          </p:nvPr>
-        </p:nvSpPr>
-        <p:spPr/>
-        <p:txBody>
-          <a:bodyPr/>
-          <a:lstStyle/>
-          <a:p>
-            <a:fld id="{157B8E69-23A9-4619-9CFE-E27BFD8A78F9}" type="slidenum">
-              <a:rPr lang="en-US" smtClean="0"/>
-              <a:t>11</a:t>
             </a:fld>
             <a:endParaRPr lang="en-US"/>
           </a:p>
@@ -5394,33 +4746,15 @@
                                   </p:childTnLst>
                                 </p:cTn>
                               </p:par>
-                            </p:childTnLst>
-                          </p:cTn>
-                        </p:par>
-                      </p:childTnLst>
-                    </p:cTn>
-                  </p:par>
-                  <p:par>
-                    <p:cTn id="19" fill="hold">
-                      <p:stCondLst>
-                        <p:cond delay="indefinite"/>
-                      </p:stCondLst>
-                      <p:childTnLst>
-                        <p:par>
-                          <p:cTn id="20" fill="hold">
-                            <p:stCondLst>
-                              <p:cond delay="0"/>
-                            </p:stCondLst>
-                            <p:childTnLst>
                               <p:par>
-                                <p:cTn id="21" presetID="1" presetClass="entr" presetSubtype="0" fill="hold" grpId="0" nodeType="clickEffect">
+                                <p:cTn id="19" presetID="1" presetClass="entr" presetSubtype="0" fill="hold" grpId="0" nodeType="withEffect">
                                   <p:stCondLst>
                                     <p:cond delay="0"/>
                                   </p:stCondLst>
                                   <p:childTnLst>
                                     <p:set>
                                       <p:cBhvr>
-                                        <p:cTn id="22" dur="1" fill="hold">
+                                        <p:cTn id="20" dur="1" fill="hold">
                                           <p:stCondLst>
                                             <p:cond delay="0"/>
                                           </p:stCondLst>
@@ -5443,8 +4777,26 @@
                                   </p:childTnLst>
                                 </p:cTn>
                               </p:par>
+                            </p:childTnLst>
+                          </p:cTn>
+                        </p:par>
+                      </p:childTnLst>
+                    </p:cTn>
+                  </p:par>
+                  <p:par>
+                    <p:cTn id="21" fill="hold">
+                      <p:stCondLst>
+                        <p:cond delay="indefinite"/>
+                      </p:stCondLst>
+                      <p:childTnLst>
+                        <p:par>
+                          <p:cTn id="22" fill="hold">
+                            <p:stCondLst>
+                              <p:cond delay="0"/>
+                            </p:stCondLst>
+                            <p:childTnLst>
                               <p:par>
-                                <p:cTn id="23" presetID="1" presetClass="entr" presetSubtype="0" fill="hold" grpId="0" nodeType="withEffect">
+                                <p:cTn id="23" presetID="1" presetClass="entr" presetSubtype="0" fill="hold" grpId="0" nodeType="clickEffect">
                                   <p:stCondLst>
                                     <p:cond delay="0"/>
                                   </p:stCondLst>
@@ -5474,33 +4826,15 @@
                                   </p:childTnLst>
                                 </p:cTn>
                               </p:par>
-                            </p:childTnLst>
-                          </p:cTn>
-                        </p:par>
-                      </p:childTnLst>
-                    </p:cTn>
-                  </p:par>
-                  <p:par>
-                    <p:cTn id="25" fill="hold">
-                      <p:stCondLst>
-                        <p:cond delay="indefinite"/>
-                      </p:stCondLst>
-                      <p:childTnLst>
-                        <p:par>
-                          <p:cTn id="26" fill="hold">
-                            <p:stCondLst>
-                              <p:cond delay="0"/>
-                            </p:stCondLst>
-                            <p:childTnLst>
                               <p:par>
-                                <p:cTn id="27" presetID="1" presetClass="entr" presetSubtype="0" fill="hold" grpId="0" nodeType="clickEffect">
+                                <p:cTn id="25" presetID="1" presetClass="entr" presetSubtype="0" fill="hold" grpId="0" nodeType="withEffect">
                                   <p:stCondLst>
                                     <p:cond delay="0"/>
                                   </p:stCondLst>
                                   <p:childTnLst>
                                     <p:set>
                                       <p:cBhvr>
-                                        <p:cTn id="28" dur="1" fill="hold">
+                                        <p:cTn id="26" dur="1" fill="hold">
                                           <p:stCondLst>
                                             <p:cond delay="0"/>
                                           </p:stCondLst>
@@ -5524,14 +4858,14 @@
                                 </p:cTn>
                               </p:par>
                               <p:par>
-                                <p:cTn id="29" presetID="1" presetClass="entr" presetSubtype="0" fill="hold" grpId="0" nodeType="withEffect">
+                                <p:cTn id="27" presetID="1" presetClass="entr" presetSubtype="0" fill="hold" grpId="0" nodeType="withEffect">
                                   <p:stCondLst>
                                     <p:cond delay="0"/>
                                   </p:stCondLst>
                                   <p:childTnLst>
                                     <p:set>
                                       <p:cBhvr>
-                                        <p:cTn id="30" dur="1" fill="hold">
+                                        <p:cTn id="28" dur="1" fill="hold">
                                           <p:stCondLst>
                                             <p:cond delay="0"/>
                                           </p:stCondLst>
@@ -5540,37 +4874,6 @@
                                           <p:spTgt spid="3">
                                             <p:txEl>
                                               <p:pRg st="7" end="7"/>
-                                            </p:txEl>
-                                          </p:spTgt>
-                                        </p:tgtEl>
-                                        <p:attrNameLst>
-                                          <p:attrName>style.visibility</p:attrName>
-                                        </p:attrNameLst>
-                                      </p:cBhvr>
-                                      <p:to>
-                                        <p:strVal val="visible"/>
-                                      </p:to>
-                                    </p:set>
-                                  </p:childTnLst>
-                                </p:cTn>
-                              </p:par>
-                              <p:par>
-                                <p:cTn id="31" presetID="1" presetClass="entr" presetSubtype="0" fill="hold" grpId="0" nodeType="withEffect">
-                                  <p:stCondLst>
-                                    <p:cond delay="0"/>
-                                  </p:stCondLst>
-                                  <p:childTnLst>
-                                    <p:set>
-                                      <p:cBhvr>
-                                        <p:cTn id="32" dur="1" fill="hold">
-                                          <p:stCondLst>
-                                            <p:cond delay="0"/>
-                                          </p:stCondLst>
-                                        </p:cTn>
-                                        <p:tgtEl>
-                                          <p:spTgt spid="3">
-                                            <p:txEl>
-                                              <p:pRg st="8" end="8"/>
                                             </p:txEl>
                                           </p:spTgt>
                                         </p:tgtEl>
@@ -5619,7 +4922,7 @@
 </p:sld>
 </file>
 
-<file path=ppt/slides/slide12.xml><?xml version="1.0" encoding="utf-8"?>
+<file path=ppt/slides/slide11.xml><?xml version="1.0" encoding="utf-8"?>
 <p:sld xmlns:a="http://schemas.openxmlformats.org/drawingml/2006/main" xmlns:r="http://schemas.openxmlformats.org/officeDocument/2006/relationships" xmlns:p="http://schemas.openxmlformats.org/presentationml/2006/main">
   <p:cSld>
     <p:spTree>
@@ -5723,7 +5026,7 @@
           <a:p>
             <a:fld id="{157B8E69-23A9-4619-9CFE-E27BFD8A78F9}" type="slidenum">
               <a:rPr lang="en-US" smtClean="0"/>
-              <a:t>12</a:t>
+              <a:t>11</a:t>
             </a:fld>
             <a:endParaRPr lang="en-US"/>
           </a:p>
@@ -6020,7 +5323,7 @@
 </p:sld>
 </file>
 
-<file path=ppt/slides/slide13.xml><?xml version="1.0" encoding="utf-8"?>
+<file path=ppt/slides/slide12.xml><?xml version="1.0" encoding="utf-8"?>
 <p:sld xmlns:a="http://schemas.openxmlformats.org/drawingml/2006/main" xmlns:r="http://schemas.openxmlformats.org/officeDocument/2006/relationships" xmlns:p="http://schemas.openxmlformats.org/presentationml/2006/main">
   <p:cSld>
     <p:spTree>
@@ -6172,7 +5475,7 @@
           <a:p>
             <a:fld id="{157B8E69-23A9-4619-9CFE-E27BFD8A78F9}" type="slidenum">
               <a:rPr lang="en-US" smtClean="0"/>
-              <a:t>13</a:t>
+              <a:t>12</a:t>
             </a:fld>
             <a:endParaRPr lang="en-US"/>
           </a:p>
@@ -6526,7 +5829,7 @@
 </p:sld>
 </file>
 
-<file path=ppt/slides/slide14.xml><?xml version="1.0" encoding="utf-8"?>
+<file path=ppt/slides/slide13.xml><?xml version="1.0" encoding="utf-8"?>
 <p:sld xmlns:a="http://schemas.openxmlformats.org/drawingml/2006/main" xmlns:r="http://schemas.openxmlformats.org/officeDocument/2006/relationships" xmlns:p="http://schemas.openxmlformats.org/presentationml/2006/main">
   <p:cSld>
     <p:spTree>
@@ -6583,7 +5886,7 @@
           <a:p>
             <a:fld id="{157B8E69-23A9-4619-9CFE-E27BFD8A78F9}" type="slidenum">
               <a:rPr lang="en-US" smtClean="0"/>
-              <a:t>14</a:t>
+              <a:t>13</a:t>
             </a:fld>
             <a:endParaRPr lang="en-US"/>
           </a:p>
@@ -8549,7 +7852,7 @@
 </p:sld>
 </file>
 
-<file path=ppt/slides/slide15.xml><?xml version="1.0" encoding="utf-8"?>
+<file path=ppt/slides/slide14.xml><?xml version="1.0" encoding="utf-8"?>
 <p:sld xmlns:a="http://schemas.openxmlformats.org/drawingml/2006/main" xmlns:r="http://schemas.openxmlformats.org/officeDocument/2006/relationships" xmlns:p="http://schemas.openxmlformats.org/presentationml/2006/main">
   <p:cSld>
     <p:spTree>
@@ -8797,7 +8100,7 @@
           <a:p>
             <a:fld id="{157B8E69-23A9-4619-9CFE-E27BFD8A78F9}" type="slidenum">
               <a:rPr lang="en-US" smtClean="0"/>
-              <a:t>15</a:t>
+              <a:t>14</a:t>
             </a:fld>
             <a:endParaRPr lang="en-US"/>
           </a:p>
@@ -19215,7 +18518,7 @@
 </p:sld>
 </file>
 
-<file path=ppt/slides/slide16.xml><?xml version="1.0" encoding="utf-8"?>
+<file path=ppt/slides/slide15.xml><?xml version="1.0" encoding="utf-8"?>
 <p:sld xmlns:a="http://schemas.openxmlformats.org/drawingml/2006/main" xmlns:r="http://schemas.openxmlformats.org/officeDocument/2006/relationships" xmlns:p="http://schemas.openxmlformats.org/presentationml/2006/main">
   <p:cSld>
     <p:spTree>
@@ -19309,7 +18612,7 @@
           <a:p>
             <a:fld id="{157B8E69-23A9-4619-9CFE-E27BFD8A78F9}" type="slidenum">
               <a:rPr lang="en-US" smtClean="0"/>
-              <a:t>16</a:t>
+              <a:t>15</a:t>
             </a:fld>
             <a:endParaRPr lang="en-US" dirty="0"/>
           </a:p>
@@ -19702,7 +19005,7 @@
 </p:sld>
 </file>
 
-<file path=ppt/slides/slide17.xml><?xml version="1.0" encoding="utf-8"?>
+<file path=ppt/slides/slide16.xml><?xml version="1.0" encoding="utf-8"?>
 <p:sld xmlns:a="http://schemas.openxmlformats.org/drawingml/2006/main" xmlns:r="http://schemas.openxmlformats.org/officeDocument/2006/relationships" xmlns:p="http://schemas.openxmlformats.org/presentationml/2006/main">
   <p:cSld>
     <p:spTree>
@@ -19796,7 +19099,7 @@
           <a:p>
             <a:fld id="{157B8E69-23A9-4619-9CFE-E27BFD8A78F9}" type="slidenum">
               <a:rPr lang="en-US" smtClean="0"/>
-              <a:t>17</a:t>
+              <a:t>16</a:t>
             </a:fld>
             <a:endParaRPr lang="en-US" dirty="0"/>
           </a:p>
@@ -20187,7 +19490,7 @@
 </p:sld>
 </file>
 
-<file path=ppt/slides/slide18.xml><?xml version="1.0" encoding="utf-8"?>
+<file path=ppt/slides/slide17.xml><?xml version="1.0" encoding="utf-8"?>
 <p:sld xmlns:a="http://schemas.openxmlformats.org/drawingml/2006/main" xmlns:r="http://schemas.openxmlformats.org/officeDocument/2006/relationships" xmlns:p="http://schemas.openxmlformats.org/presentationml/2006/main">
   <p:cSld>
     <p:spTree>
@@ -20351,7 +19654,7 @@
           <a:p>
             <a:fld id="{157B8E69-23A9-4619-9CFE-E27BFD8A78F9}" type="slidenum">
               <a:rPr lang="en-US" smtClean="0"/>
-              <a:t>18</a:t>
+              <a:t>17</a:t>
             </a:fld>
             <a:endParaRPr lang="en-US"/>
           </a:p>
@@ -22196,7 +21499,7 @@
 </p:sld>
 </file>
 
-<file path=ppt/slides/slide19.xml><?xml version="1.0" encoding="utf-8"?>
+<file path=ppt/slides/slide18.xml><?xml version="1.0" encoding="utf-8"?>
 <p:sld xmlns:a="http://schemas.openxmlformats.org/drawingml/2006/main" xmlns:r="http://schemas.openxmlformats.org/officeDocument/2006/relationships" xmlns:p="http://schemas.openxmlformats.org/presentationml/2006/main">
   <p:cSld>
     <p:spTree>
@@ -22300,7 +21603,7 @@
           <a:p>
             <a:fld id="{157B8E69-23A9-4619-9CFE-E27BFD8A78F9}" type="slidenum">
               <a:rPr lang="en-US" smtClean="0"/>
-              <a:t>19</a:t>
+              <a:t>18</a:t>
             </a:fld>
             <a:endParaRPr lang="en-US"/>
           </a:p>
@@ -22326,321 +21629,7 @@
 </p:sld>
 </file>
 
-<file path=ppt/slides/slide2.xml><?xml version="1.0" encoding="utf-8"?>
-<p:sld xmlns:a="http://schemas.openxmlformats.org/drawingml/2006/main" xmlns:r="http://schemas.openxmlformats.org/officeDocument/2006/relationships" xmlns:p="http://schemas.openxmlformats.org/presentationml/2006/main">
-  <p:cSld>
-    <p:spTree>
-      <p:nvGrpSpPr>
-        <p:cNvPr id="1" name=""/>
-        <p:cNvGrpSpPr/>
-        <p:nvPr/>
-      </p:nvGrpSpPr>
-      <p:grpSpPr>
-        <a:xfrm>
-          <a:off x="0" y="0"/>
-          <a:ext cx="0" cy="0"/>
-          <a:chOff x="0" y="0"/>
-          <a:chExt cx="0" cy="0"/>
-        </a:xfrm>
-      </p:grpSpPr>
-      <p:sp>
-        <p:nvSpPr>
-          <p:cNvPr id="2" name="Title 1"/>
-          <p:cNvSpPr>
-            <a:spLocks noGrp="1"/>
-          </p:cNvSpPr>
-          <p:nvPr>
-            <p:ph type="title"/>
-          </p:nvPr>
-        </p:nvSpPr>
-        <p:spPr/>
-        <p:txBody>
-          <a:bodyPr/>
-          <a:lstStyle/>
-          <a:p>
-            <a:r>
-              <a:rPr lang="en-IN" dirty="0" smtClean="0"/>
-              <a:t>Add-Drop</a:t>
-            </a:r>
-            <a:endParaRPr lang="en-IN" dirty="0"/>
-          </a:p>
-        </p:txBody>
-      </p:sp>
-      <p:sp>
-        <p:nvSpPr>
-          <p:cNvPr id="3" name="Content Placeholder 2"/>
-          <p:cNvSpPr>
-            <a:spLocks noGrp="1"/>
-          </p:cNvSpPr>
-          <p:nvPr>
-            <p:ph idx="1"/>
-          </p:nvPr>
-        </p:nvSpPr>
-        <p:spPr/>
-        <p:txBody>
-          <a:bodyPr/>
-          <a:lstStyle/>
-          <a:p>
-            <a:r>
-              <a:rPr lang="en-IN" dirty="0" smtClean="0"/>
-              <a:t>Add requests will be processed according to pre-declared </a:t>
-            </a:r>
-            <a:r>
-              <a:rPr lang="en-IN" dirty="0"/>
-              <a:t>policy</a:t>
-            </a:r>
-            <a:br>
-              <a:rPr lang="en-IN" dirty="0"/>
-            </a:br>
-            <a:r>
-              <a:rPr lang="en-IN" dirty="0">
-                <a:hlinkClick r:id="rId2"/>
-              </a:rPr>
-              <a:t>http://</a:t>
-            </a:r>
-            <a:r>
-              <a:rPr lang="en-IN" dirty="0" smtClean="0">
-                <a:hlinkClick r:id="rId2"/>
-              </a:rPr>
-              <a:t>tinyurl.com/ml19-20wfaq</a:t>
-            </a:r>
-            <a:endParaRPr lang="en-IN" dirty="0" smtClean="0"/>
-          </a:p>
-          <a:p>
-            <a:r>
-              <a:rPr lang="en-IN" dirty="0" smtClean="0"/>
-              <a:t>All queries, requests, clarifications regarding add-drop will be handled </a:t>
-            </a:r>
-            <a:r>
-              <a:rPr lang="en-IN" b="1" dirty="0" smtClean="0"/>
-              <a:t>only over email</a:t>
-            </a:r>
-          </a:p>
-          <a:p>
-            <a:r>
-              <a:rPr lang="en-IN" dirty="0" smtClean="0"/>
-              <a:t>Please do not approach me in person after class/in my office without prior appointment – I will not be able to respond to you in person</a:t>
-            </a:r>
-          </a:p>
-        </p:txBody>
-      </p:sp>
-      <p:sp>
-        <p:nvSpPr>
-          <p:cNvPr id="4" name="Slide Number Placeholder 3"/>
-          <p:cNvSpPr>
-            <a:spLocks noGrp="1"/>
-          </p:cNvSpPr>
-          <p:nvPr>
-            <p:ph type="sldNum" sz="quarter" idx="12"/>
-          </p:nvPr>
-        </p:nvSpPr>
-        <p:spPr/>
-        <p:txBody>
-          <a:bodyPr/>
-          <a:lstStyle/>
-          <a:p>
-            <a:fld id="{157B8E69-23A9-4619-9CFE-E27BFD8A78F9}" type="slidenum">
-              <a:rPr lang="en-US" smtClean="0"/>
-              <a:t>2</a:t>
-            </a:fld>
-            <a:endParaRPr lang="en-US"/>
-          </a:p>
-        </p:txBody>
-      </p:sp>
-    </p:spTree>
-    <p:extLst>
-      <p:ext uri="{BB962C8B-B14F-4D97-AF65-F5344CB8AC3E}">
-        <p14:creationId xmlns:p14="http://schemas.microsoft.com/office/powerpoint/2010/main" val="1179374061"/>
-      </p:ext>
-    </p:extLst>
-  </p:cSld>
-  <p:clrMapOvr>
-    <a:masterClrMapping/>
-  </p:clrMapOvr>
-  <p:timing>
-    <p:tnLst>
-      <p:par>
-        <p:cTn id="1" dur="indefinite" restart="never" nodeType="tmRoot">
-          <p:childTnLst>
-            <p:seq concurrent="1" nextAc="seek">
-              <p:cTn id="2" dur="indefinite" nodeType="mainSeq">
-                <p:childTnLst>
-                  <p:par>
-                    <p:cTn id="3" fill="hold">
-                      <p:stCondLst>
-                        <p:cond delay="indefinite"/>
-                      </p:stCondLst>
-                      <p:childTnLst>
-                        <p:par>
-                          <p:cTn id="4" fill="hold">
-                            <p:stCondLst>
-                              <p:cond delay="0"/>
-                            </p:stCondLst>
-                            <p:childTnLst>
-                              <p:par>
-                                <p:cTn id="5" presetID="1" presetClass="entr" presetSubtype="0" fill="hold" grpId="0" nodeType="clickEffect">
-                                  <p:stCondLst>
-                                    <p:cond delay="0"/>
-                                  </p:stCondLst>
-                                  <p:childTnLst>
-                                    <p:set>
-                                      <p:cBhvr>
-                                        <p:cTn id="6" dur="1" fill="hold">
-                                          <p:stCondLst>
-                                            <p:cond delay="0"/>
-                                          </p:stCondLst>
-                                        </p:cTn>
-                                        <p:tgtEl>
-                                          <p:spTgt spid="3">
-                                            <p:txEl>
-                                              <p:pRg st="0" end="0"/>
-                                            </p:txEl>
-                                          </p:spTgt>
-                                        </p:tgtEl>
-                                        <p:attrNameLst>
-                                          <p:attrName>style.visibility</p:attrName>
-                                        </p:attrNameLst>
-                                      </p:cBhvr>
-                                      <p:to>
-                                        <p:strVal val="visible"/>
-                                      </p:to>
-                                    </p:set>
-                                  </p:childTnLst>
-                                </p:cTn>
-                              </p:par>
-                            </p:childTnLst>
-                          </p:cTn>
-                        </p:par>
-                      </p:childTnLst>
-                    </p:cTn>
-                  </p:par>
-                  <p:par>
-                    <p:cTn id="7" fill="hold">
-                      <p:stCondLst>
-                        <p:cond delay="indefinite"/>
-                      </p:stCondLst>
-                      <p:childTnLst>
-                        <p:par>
-                          <p:cTn id="8" fill="hold">
-                            <p:stCondLst>
-                              <p:cond delay="0"/>
-                            </p:stCondLst>
-                            <p:childTnLst>
-                              <p:par>
-                                <p:cTn id="9" presetID="1" presetClass="entr" presetSubtype="0" fill="hold" grpId="0" nodeType="clickEffect">
-                                  <p:stCondLst>
-                                    <p:cond delay="0"/>
-                                  </p:stCondLst>
-                                  <p:childTnLst>
-                                    <p:set>
-                                      <p:cBhvr>
-                                        <p:cTn id="10" dur="1" fill="hold">
-                                          <p:stCondLst>
-                                            <p:cond delay="0"/>
-                                          </p:stCondLst>
-                                        </p:cTn>
-                                        <p:tgtEl>
-                                          <p:spTgt spid="3">
-                                            <p:txEl>
-                                              <p:pRg st="1" end="1"/>
-                                            </p:txEl>
-                                          </p:spTgt>
-                                        </p:tgtEl>
-                                        <p:attrNameLst>
-                                          <p:attrName>style.visibility</p:attrName>
-                                        </p:attrNameLst>
-                                      </p:cBhvr>
-                                      <p:to>
-                                        <p:strVal val="visible"/>
-                                      </p:to>
-                                    </p:set>
-                                  </p:childTnLst>
-                                </p:cTn>
-                              </p:par>
-                            </p:childTnLst>
-                          </p:cTn>
-                        </p:par>
-                      </p:childTnLst>
-                    </p:cTn>
-                  </p:par>
-                  <p:par>
-                    <p:cTn id="11" fill="hold">
-                      <p:stCondLst>
-                        <p:cond delay="indefinite"/>
-                      </p:stCondLst>
-                      <p:childTnLst>
-                        <p:par>
-                          <p:cTn id="12" fill="hold">
-                            <p:stCondLst>
-                              <p:cond delay="0"/>
-                            </p:stCondLst>
-                            <p:childTnLst>
-                              <p:par>
-                                <p:cTn id="13" presetID="1" presetClass="entr" presetSubtype="0" fill="hold" grpId="0" nodeType="clickEffect">
-                                  <p:stCondLst>
-                                    <p:cond delay="0"/>
-                                  </p:stCondLst>
-                                  <p:childTnLst>
-                                    <p:set>
-                                      <p:cBhvr>
-                                        <p:cTn id="14" dur="1" fill="hold">
-                                          <p:stCondLst>
-                                            <p:cond delay="0"/>
-                                          </p:stCondLst>
-                                        </p:cTn>
-                                        <p:tgtEl>
-                                          <p:spTgt spid="3">
-                                            <p:txEl>
-                                              <p:pRg st="2" end="2"/>
-                                            </p:txEl>
-                                          </p:spTgt>
-                                        </p:tgtEl>
-                                        <p:attrNameLst>
-                                          <p:attrName>style.visibility</p:attrName>
-                                        </p:attrNameLst>
-                                      </p:cBhvr>
-                                      <p:to>
-                                        <p:strVal val="visible"/>
-                                      </p:to>
-                                    </p:set>
-                                  </p:childTnLst>
-                                </p:cTn>
-                              </p:par>
-                            </p:childTnLst>
-                          </p:cTn>
-                        </p:par>
-                      </p:childTnLst>
-                    </p:cTn>
-                  </p:par>
-                </p:childTnLst>
-              </p:cTn>
-              <p:prevCondLst>
-                <p:cond evt="onPrev" delay="0">
-                  <p:tgtEl>
-                    <p:sldTgt/>
-                  </p:tgtEl>
-                </p:cond>
-              </p:prevCondLst>
-              <p:nextCondLst>
-                <p:cond evt="onNext" delay="0">
-                  <p:tgtEl>
-                    <p:sldTgt/>
-                  </p:tgtEl>
-                </p:cond>
-              </p:nextCondLst>
-            </p:seq>
-          </p:childTnLst>
-        </p:cTn>
-      </p:par>
-    </p:tnLst>
-    <p:bldLst>
-      <p:bldP spid="3" grpId="0" build="p"/>
-    </p:bldLst>
-  </p:timing>
-</p:sld>
-</file>
-
-<file path=ppt/slides/slide20.xml><?xml version="1.0" encoding="utf-8"?>
+<file path=ppt/slides/slide19.xml><?xml version="1.0" encoding="utf-8"?>
 <p:sld xmlns:a="http://schemas.openxmlformats.org/drawingml/2006/main" xmlns:r="http://schemas.openxmlformats.org/officeDocument/2006/relationships" xmlns:p="http://schemas.openxmlformats.org/presentationml/2006/main">
   <p:cSld>
     <p:spTree>
@@ -22966,7 +21955,7 @@
           <a:p>
             <a:fld id="{157B8E69-23A9-4619-9CFE-E27BFD8A78F9}" type="slidenum">
               <a:rPr lang="en-US" smtClean="0"/>
-              <a:t>20</a:t>
+              <a:t>19</a:t>
             </a:fld>
             <a:endParaRPr lang="en-US"/>
           </a:p>
@@ -23601,7 +22590,548 @@
 </p:sld>
 </file>
 
-<file path=ppt/slides/slide21.xml><?xml version="1.0" encoding="utf-8"?>
+<file path=ppt/slides/slide2.xml><?xml version="1.0" encoding="utf-8"?>
+<p:sld xmlns:a="http://schemas.openxmlformats.org/drawingml/2006/main" xmlns:r="http://schemas.openxmlformats.org/officeDocument/2006/relationships" xmlns:p="http://schemas.openxmlformats.org/presentationml/2006/main">
+  <p:cSld>
+    <p:spTree>
+      <p:nvGrpSpPr>
+        <p:cNvPr id="1" name=""/>
+        <p:cNvGrpSpPr/>
+        <p:nvPr/>
+      </p:nvGrpSpPr>
+      <p:grpSpPr>
+        <a:xfrm>
+          <a:off x="0" y="0"/>
+          <a:ext cx="0" cy="0"/>
+          <a:chOff x="0" y="0"/>
+          <a:chExt cx="0" cy="0"/>
+        </a:xfrm>
+      </p:grpSpPr>
+      <p:sp>
+        <p:nvSpPr>
+          <p:cNvPr id="2" name="Title 1"/>
+          <p:cNvSpPr>
+            <a:spLocks noGrp="1"/>
+          </p:cNvSpPr>
+          <p:nvPr>
+            <p:ph type="title"/>
+          </p:nvPr>
+        </p:nvSpPr>
+        <p:spPr/>
+        <p:txBody>
+          <a:bodyPr/>
+          <a:lstStyle/>
+          <a:p>
+            <a:r>
+              <a:rPr lang="en-US" dirty="0" smtClean="0"/>
+              <a:t>Course Details</a:t>
+            </a:r>
+            <a:endParaRPr lang="en-US" dirty="0"/>
+          </a:p>
+        </p:txBody>
+      </p:sp>
+      <p:sp>
+        <p:nvSpPr>
+          <p:cNvPr id="3" name="Content Placeholder 2"/>
+          <p:cNvSpPr>
+            <a:spLocks noGrp="1"/>
+          </p:cNvSpPr>
+          <p:nvPr>
+            <p:ph idx="1"/>
+          </p:nvPr>
+        </p:nvSpPr>
+        <p:spPr/>
+        <p:txBody>
+          <a:bodyPr/>
+          <a:lstStyle/>
+          <a:p>
+            <a:r>
+              <a:rPr lang="en-US" b="1" dirty="0" smtClean="0"/>
+              <a:t>Name</a:t>
+            </a:r>
+            <a:r>
+              <a:rPr lang="en-US" dirty="0" smtClean="0"/>
+              <a:t>: CS771 Introduction to Machine Learning</a:t>
+            </a:r>
+          </a:p>
+          <a:p>
+            <a:r>
+              <a:rPr lang="en-US" b="1" dirty="0" smtClean="0"/>
+              <a:t>Lectures</a:t>
+            </a:r>
+            <a:r>
+              <a:rPr lang="en-US" dirty="0" smtClean="0"/>
+              <a:t>: Mon, Wed, Fri, </a:t>
+            </a:r>
+            <a:r>
+              <a:rPr lang="en-US" dirty="0"/>
+              <a:t>6:30-7:30 </a:t>
+            </a:r>
+            <a:r>
+              <a:rPr lang="en-US" dirty="0" smtClean="0"/>
+              <a:t>PM RM101</a:t>
+            </a:r>
+          </a:p>
+          <a:p>
+            <a:r>
+              <a:rPr lang="en-US" b="1" dirty="0" smtClean="0"/>
+              <a:t>Course Team</a:t>
+            </a:r>
+            <a:r>
+              <a:rPr lang="en-US" dirty="0" smtClean="0"/>
+              <a:t>: </a:t>
+            </a:r>
+            <a:r>
+              <a:rPr lang="en-US" dirty="0"/>
+              <a:t>wait for next slide</a:t>
+            </a:r>
+            <a:endParaRPr lang="en-US" dirty="0" smtClean="0"/>
+          </a:p>
+          <a:p>
+            <a:r>
+              <a:rPr lang="en-US" b="1" dirty="0" smtClean="0"/>
+              <a:t>Course Website</a:t>
+            </a:r>
+            <a:r>
+              <a:rPr lang="en-US" dirty="0"/>
+              <a:t>: </a:t>
+            </a:r>
+            <a:r>
+              <a:rPr lang="en-US" dirty="0">
+                <a:hlinkClick r:id="rId2"/>
+              </a:rPr>
+              <a:t>https://</a:t>
+            </a:r>
+            <a:r>
+              <a:rPr lang="en-US" dirty="0" smtClean="0">
+                <a:hlinkClick r:id="rId2"/>
+              </a:rPr>
+              <a:t>tinyurl.com/ml19-20ww</a:t>
+            </a:r>
+            <a:endParaRPr lang="en-US" dirty="0" smtClean="0"/>
+          </a:p>
+          <a:p>
+            <a:r>
+              <a:rPr lang="en-US" b="1" dirty="0" smtClean="0"/>
+              <a:t>Piazza Website</a:t>
+            </a:r>
+            <a:r>
+              <a:rPr lang="en-US" dirty="0" smtClean="0"/>
+              <a:t>: </a:t>
+            </a:r>
+            <a:r>
+              <a:rPr lang="en-US" dirty="0">
+                <a:hlinkClick r:id="rId3"/>
+              </a:rPr>
+              <a:t>https://</a:t>
+            </a:r>
+            <a:r>
+              <a:rPr lang="en-US" dirty="0" smtClean="0">
+                <a:hlinkClick r:id="rId3"/>
+              </a:rPr>
+              <a:t>tinyurl.com/ml19-20wp</a:t>
+            </a:r>
+            <a:r>
+              <a:rPr lang="en-US" dirty="0" smtClean="0"/>
+              <a:t> (Enroll yourself!)</a:t>
+            </a:r>
+          </a:p>
+          <a:p>
+            <a:r>
+              <a:rPr lang="en-US" b="1" dirty="0" smtClean="0"/>
+              <a:t>Office hours</a:t>
+            </a:r>
+            <a:r>
+              <a:rPr lang="en-US" dirty="0" smtClean="0"/>
+              <a:t>: uploaded </a:t>
+            </a:r>
+            <a:r>
+              <a:rPr lang="en-US" dirty="0"/>
+              <a:t>on Piazza</a:t>
+            </a:r>
+            <a:br>
+              <a:rPr lang="en-US" dirty="0"/>
+            </a:br>
+            <a:r>
+              <a:rPr lang="en-US" dirty="0">
+                <a:hlinkClick r:id="rId4"/>
+              </a:rPr>
+              <a:t>https://</a:t>
+            </a:r>
+            <a:r>
+              <a:rPr lang="en-US" dirty="0" smtClean="0">
+                <a:hlinkClick r:id="rId4"/>
+              </a:rPr>
+              <a:t>piazza.com/iitk.ac.in/secondsemester2020/cs771/staff</a:t>
+            </a:r>
+            <a:endParaRPr lang="en-US" dirty="0"/>
+          </a:p>
+        </p:txBody>
+      </p:sp>
+      <p:sp>
+        <p:nvSpPr>
+          <p:cNvPr id="4" name="Slide Number Placeholder 3"/>
+          <p:cNvSpPr>
+            <a:spLocks noGrp="1"/>
+          </p:cNvSpPr>
+          <p:nvPr>
+            <p:ph type="sldNum" sz="quarter" idx="12"/>
+          </p:nvPr>
+        </p:nvSpPr>
+        <p:spPr/>
+        <p:txBody>
+          <a:bodyPr/>
+          <a:lstStyle/>
+          <a:p>
+            <a:fld id="{157B8E69-23A9-4619-9CFE-E27BFD8A78F9}" type="slidenum">
+              <a:rPr lang="en-US" smtClean="0"/>
+              <a:t>2</a:t>
+            </a:fld>
+            <a:endParaRPr lang="en-US"/>
+          </a:p>
+        </p:txBody>
+      </p:sp>
+    </p:spTree>
+    <p:extLst>
+      <p:ext uri="{BB962C8B-B14F-4D97-AF65-F5344CB8AC3E}">
+        <p14:creationId xmlns:p14="http://schemas.microsoft.com/office/powerpoint/2010/main" val="2170869476"/>
+      </p:ext>
+    </p:extLst>
+  </p:cSld>
+  <p:clrMapOvr>
+    <a:masterClrMapping/>
+  </p:clrMapOvr>
+  <p:timing>
+    <p:tnLst>
+      <p:par>
+        <p:cTn id="1" dur="indefinite" restart="never" nodeType="tmRoot">
+          <p:childTnLst>
+            <p:seq concurrent="1" nextAc="seek">
+              <p:cTn id="2" dur="indefinite" nodeType="mainSeq">
+                <p:childTnLst>
+                  <p:par>
+                    <p:cTn id="3" fill="hold">
+                      <p:stCondLst>
+                        <p:cond delay="indefinite"/>
+                      </p:stCondLst>
+                      <p:childTnLst>
+                        <p:par>
+                          <p:cTn id="4" fill="hold">
+                            <p:stCondLst>
+                              <p:cond delay="0"/>
+                            </p:stCondLst>
+                            <p:childTnLst>
+                              <p:par>
+                                <p:cTn id="5" presetID="1" presetClass="entr" presetSubtype="0" fill="hold" grpId="0" nodeType="clickEffect">
+                                  <p:stCondLst>
+                                    <p:cond delay="0"/>
+                                  </p:stCondLst>
+                                  <p:childTnLst>
+                                    <p:set>
+                                      <p:cBhvr>
+                                        <p:cTn id="6" dur="1" fill="hold">
+                                          <p:stCondLst>
+                                            <p:cond delay="0"/>
+                                          </p:stCondLst>
+                                        </p:cTn>
+                                        <p:tgtEl>
+                                          <p:spTgt spid="3">
+                                            <p:txEl>
+                                              <p:pRg st="0" end="0"/>
+                                            </p:txEl>
+                                          </p:spTgt>
+                                        </p:tgtEl>
+                                        <p:attrNameLst>
+                                          <p:attrName>style.visibility</p:attrName>
+                                        </p:attrNameLst>
+                                      </p:cBhvr>
+                                      <p:to>
+                                        <p:strVal val="visible"/>
+                                      </p:to>
+                                    </p:set>
+                                  </p:childTnLst>
+                                </p:cTn>
+                              </p:par>
+                            </p:childTnLst>
+                          </p:cTn>
+                        </p:par>
+                      </p:childTnLst>
+                    </p:cTn>
+                  </p:par>
+                  <p:par>
+                    <p:cTn id="7" fill="hold">
+                      <p:stCondLst>
+                        <p:cond delay="indefinite"/>
+                      </p:stCondLst>
+                      <p:childTnLst>
+                        <p:par>
+                          <p:cTn id="8" fill="hold">
+                            <p:stCondLst>
+                              <p:cond delay="0"/>
+                            </p:stCondLst>
+                            <p:childTnLst>
+                              <p:par>
+                                <p:cTn id="9" presetID="1" presetClass="entr" presetSubtype="0" fill="hold" grpId="0" nodeType="clickEffect">
+                                  <p:stCondLst>
+                                    <p:cond delay="0"/>
+                                  </p:stCondLst>
+                                  <p:childTnLst>
+                                    <p:set>
+                                      <p:cBhvr>
+                                        <p:cTn id="10" dur="1" fill="hold">
+                                          <p:stCondLst>
+                                            <p:cond delay="0"/>
+                                          </p:stCondLst>
+                                        </p:cTn>
+                                        <p:tgtEl>
+                                          <p:spTgt spid="3">
+                                            <p:txEl>
+                                              <p:pRg st="1" end="1"/>
+                                            </p:txEl>
+                                          </p:spTgt>
+                                        </p:tgtEl>
+                                        <p:attrNameLst>
+                                          <p:attrName>style.visibility</p:attrName>
+                                        </p:attrNameLst>
+                                      </p:cBhvr>
+                                      <p:to>
+                                        <p:strVal val="visible"/>
+                                      </p:to>
+                                    </p:set>
+                                  </p:childTnLst>
+                                </p:cTn>
+                              </p:par>
+                            </p:childTnLst>
+                          </p:cTn>
+                        </p:par>
+                      </p:childTnLst>
+                    </p:cTn>
+                  </p:par>
+                  <p:par>
+                    <p:cTn id="11" fill="hold">
+                      <p:stCondLst>
+                        <p:cond delay="indefinite"/>
+                      </p:stCondLst>
+                      <p:childTnLst>
+                        <p:par>
+                          <p:cTn id="12" fill="hold">
+                            <p:stCondLst>
+                              <p:cond delay="0"/>
+                            </p:stCondLst>
+                            <p:childTnLst>
+                              <p:par>
+                                <p:cTn id="13" presetID="1" presetClass="entr" presetSubtype="0" fill="hold" grpId="0" nodeType="clickEffect">
+                                  <p:stCondLst>
+                                    <p:cond delay="0"/>
+                                  </p:stCondLst>
+                                  <p:childTnLst>
+                                    <p:set>
+                                      <p:cBhvr>
+                                        <p:cTn id="14" dur="1" fill="hold">
+                                          <p:stCondLst>
+                                            <p:cond delay="0"/>
+                                          </p:stCondLst>
+                                        </p:cTn>
+                                        <p:tgtEl>
+                                          <p:spTgt spid="3">
+                                            <p:txEl>
+                                              <p:pRg st="2" end="2"/>
+                                            </p:txEl>
+                                          </p:spTgt>
+                                        </p:tgtEl>
+                                        <p:attrNameLst>
+                                          <p:attrName>style.visibility</p:attrName>
+                                        </p:attrNameLst>
+                                      </p:cBhvr>
+                                      <p:to>
+                                        <p:strVal val="visible"/>
+                                      </p:to>
+                                    </p:set>
+                                  </p:childTnLst>
+                                </p:cTn>
+                              </p:par>
+                            </p:childTnLst>
+                          </p:cTn>
+                        </p:par>
+                      </p:childTnLst>
+                    </p:cTn>
+                  </p:par>
+                  <p:par>
+                    <p:cTn id="15" fill="hold">
+                      <p:stCondLst>
+                        <p:cond delay="indefinite"/>
+                      </p:stCondLst>
+                      <p:childTnLst>
+                        <p:par>
+                          <p:cTn id="16" fill="hold">
+                            <p:stCondLst>
+                              <p:cond delay="0"/>
+                            </p:stCondLst>
+                            <p:childTnLst>
+                              <p:par>
+                                <p:cTn id="17" presetID="1" presetClass="entr" presetSubtype="0" fill="hold" grpId="0" nodeType="clickEffect">
+                                  <p:stCondLst>
+                                    <p:cond delay="0"/>
+                                  </p:stCondLst>
+                                  <p:childTnLst>
+                                    <p:set>
+                                      <p:cBhvr>
+                                        <p:cTn id="18" dur="1" fill="hold">
+                                          <p:stCondLst>
+                                            <p:cond delay="0"/>
+                                          </p:stCondLst>
+                                        </p:cTn>
+                                        <p:tgtEl>
+                                          <p:spTgt spid="3">
+                                            <p:txEl>
+                                              <p:pRg st="3" end="3"/>
+                                            </p:txEl>
+                                          </p:spTgt>
+                                        </p:tgtEl>
+                                        <p:attrNameLst>
+                                          <p:attrName>style.visibility</p:attrName>
+                                        </p:attrNameLst>
+                                      </p:cBhvr>
+                                      <p:to>
+                                        <p:strVal val="visible"/>
+                                      </p:to>
+                                    </p:set>
+                                  </p:childTnLst>
+                                </p:cTn>
+                              </p:par>
+                            </p:childTnLst>
+                          </p:cTn>
+                        </p:par>
+                      </p:childTnLst>
+                    </p:cTn>
+                  </p:par>
+                  <p:par>
+                    <p:cTn id="19" fill="hold">
+                      <p:stCondLst>
+                        <p:cond delay="indefinite"/>
+                      </p:stCondLst>
+                      <p:childTnLst>
+                        <p:par>
+                          <p:cTn id="20" fill="hold">
+                            <p:stCondLst>
+                              <p:cond delay="0"/>
+                            </p:stCondLst>
+                            <p:childTnLst>
+                              <p:par>
+                                <p:cTn id="21" presetID="1" presetClass="entr" presetSubtype="0" fill="hold" grpId="0" nodeType="clickEffect">
+                                  <p:stCondLst>
+                                    <p:cond delay="0"/>
+                                  </p:stCondLst>
+                                  <p:childTnLst>
+                                    <p:set>
+                                      <p:cBhvr>
+                                        <p:cTn id="22" dur="1" fill="hold">
+                                          <p:stCondLst>
+                                            <p:cond delay="0"/>
+                                          </p:stCondLst>
+                                        </p:cTn>
+                                        <p:tgtEl>
+                                          <p:spTgt spid="3">
+                                            <p:txEl>
+                                              <p:pRg st="4" end="4"/>
+                                            </p:txEl>
+                                          </p:spTgt>
+                                        </p:tgtEl>
+                                        <p:attrNameLst>
+                                          <p:attrName>style.visibility</p:attrName>
+                                        </p:attrNameLst>
+                                      </p:cBhvr>
+                                      <p:to>
+                                        <p:strVal val="visible"/>
+                                      </p:to>
+                                    </p:set>
+                                  </p:childTnLst>
+                                </p:cTn>
+                              </p:par>
+                            </p:childTnLst>
+                          </p:cTn>
+                        </p:par>
+                      </p:childTnLst>
+                    </p:cTn>
+                  </p:par>
+                  <p:par>
+                    <p:cTn id="23" fill="hold">
+                      <p:stCondLst>
+                        <p:cond delay="indefinite"/>
+                      </p:stCondLst>
+                      <p:childTnLst>
+                        <p:par>
+                          <p:cTn id="24" fill="hold">
+                            <p:stCondLst>
+                              <p:cond delay="0"/>
+                            </p:stCondLst>
+                            <p:childTnLst>
+                              <p:par>
+                                <p:cTn id="25" presetID="1" presetClass="entr" presetSubtype="0" fill="hold" grpId="0" nodeType="clickEffect">
+                                  <p:stCondLst>
+                                    <p:cond delay="0"/>
+                                  </p:stCondLst>
+                                  <p:childTnLst>
+                                    <p:set>
+                                      <p:cBhvr>
+                                        <p:cTn id="26" dur="1" fill="hold">
+                                          <p:stCondLst>
+                                            <p:cond delay="0"/>
+                                          </p:stCondLst>
+                                        </p:cTn>
+                                        <p:tgtEl>
+                                          <p:spTgt spid="3">
+                                            <p:txEl>
+                                              <p:pRg st="5" end="5"/>
+                                            </p:txEl>
+                                          </p:spTgt>
+                                        </p:tgtEl>
+                                        <p:attrNameLst>
+                                          <p:attrName>style.visibility</p:attrName>
+                                        </p:attrNameLst>
+                                      </p:cBhvr>
+                                      <p:to>
+                                        <p:strVal val="visible"/>
+                                      </p:to>
+                                    </p:set>
+                                  </p:childTnLst>
+                                </p:cTn>
+                              </p:par>
+                            </p:childTnLst>
+                          </p:cTn>
+                        </p:par>
+                      </p:childTnLst>
+                    </p:cTn>
+                  </p:par>
+                </p:childTnLst>
+              </p:cTn>
+              <p:prevCondLst>
+                <p:cond evt="onPrev" delay="0">
+                  <p:tgtEl>
+                    <p:sldTgt/>
+                  </p:tgtEl>
+                </p:cond>
+              </p:prevCondLst>
+              <p:nextCondLst>
+                <p:cond evt="onNext" delay="0">
+                  <p:tgtEl>
+                    <p:sldTgt/>
+                  </p:tgtEl>
+                </p:cond>
+              </p:nextCondLst>
+            </p:seq>
+          </p:childTnLst>
+        </p:cTn>
+      </p:par>
+    </p:tnLst>
+    <p:bldLst>
+      <p:bldP spid="3" grpId="0" build="p"/>
+    </p:bldLst>
+  </p:timing>
+</p:sld>
+</file>
+
+<file path=ppt/slides/slide20.xml><?xml version="1.0" encoding="utf-8"?>
 <p:sld xmlns:a="http://schemas.openxmlformats.org/drawingml/2006/main" xmlns:r="http://schemas.openxmlformats.org/officeDocument/2006/relationships" xmlns:p="http://schemas.openxmlformats.org/presentationml/2006/main">
   <p:cSld>
     <p:spTree>
@@ -23750,7 +23280,7 @@
           <a:p>
             <a:fld id="{157B8E69-23A9-4619-9CFE-E27BFD8A78F9}" type="slidenum">
               <a:rPr lang="en-US" smtClean="0"/>
-              <a:t>21</a:t>
+              <a:t>20</a:t>
             </a:fld>
             <a:endParaRPr lang="en-US"/>
           </a:p>
@@ -24518,7 +24048,7 @@
 </p:sld>
 </file>
 
-<file path=ppt/slides/slide22.xml><?xml version="1.0" encoding="utf-8"?>
+<file path=ppt/slides/slide21.xml><?xml version="1.0" encoding="utf-8"?>
 <p:sld xmlns:a="http://schemas.openxmlformats.org/drawingml/2006/main" xmlns:r="http://schemas.openxmlformats.org/officeDocument/2006/relationships" xmlns:p="http://schemas.openxmlformats.org/presentationml/2006/main">
   <p:cSld>
     <p:spTree>
@@ -24575,7 +24105,7 @@
           <a:p>
             <a:fld id="{157B8E69-23A9-4619-9CFE-E27BFD8A78F9}" type="slidenum">
               <a:rPr lang="en-US" smtClean="0"/>
-              <a:t>22</a:t>
+              <a:t>21</a:t>
             </a:fld>
             <a:endParaRPr lang="en-US"/>
           </a:p>
@@ -24741,7 +24271,7 @@
 </p:sld>
 </file>
 
-<file path=ppt/slides/slide23.xml><?xml version="1.0" encoding="utf-8"?>
+<file path=ppt/slides/slide22.xml><?xml version="1.0" encoding="utf-8"?>
 <p:sld xmlns:a="http://schemas.openxmlformats.org/drawingml/2006/main" xmlns:r="http://schemas.openxmlformats.org/officeDocument/2006/relationships" xmlns:p="http://schemas.openxmlformats.org/presentationml/2006/main">
   <p:cSld>
     <p:spTree>
@@ -24798,7 +24328,7 @@
           <a:p>
             <a:fld id="{157B8E69-23A9-4619-9CFE-E27BFD8A78F9}" type="slidenum">
               <a:rPr lang="en-US" smtClean="0"/>
-              <a:t>23</a:t>
+              <a:t>22</a:t>
             </a:fld>
             <a:endParaRPr lang="en-US"/>
           </a:p>
@@ -24871,7 +24401,7 @@
 </p:sld>
 </file>
 
-<file path=ppt/slides/slide24.xml><?xml version="1.0" encoding="utf-8"?>
+<file path=ppt/slides/slide23.xml><?xml version="1.0" encoding="utf-8"?>
 <p:sld xmlns:a="http://schemas.openxmlformats.org/drawingml/2006/main" xmlns:r="http://schemas.openxmlformats.org/officeDocument/2006/relationships" xmlns:p="http://schemas.openxmlformats.org/presentationml/2006/main">
   <p:cSld>
     <p:spTree>
@@ -24928,7 +24458,7 @@
           <a:p>
             <a:fld id="{157B8E69-23A9-4619-9CFE-E27BFD8A78F9}" type="slidenum">
               <a:rPr lang="en-US" smtClean="0"/>
-              <a:t>24</a:t>
+              <a:t>23</a:t>
             </a:fld>
             <a:endParaRPr lang="en-US"/>
           </a:p>
@@ -25025,7 +24555,7 @@
 </p:sld>
 </file>
 
-<file path=ppt/slides/slide25.xml><?xml version="1.0" encoding="utf-8"?>
+<file path=ppt/slides/slide24.xml><?xml version="1.0" encoding="utf-8"?>
 <p:sld xmlns:a="http://schemas.openxmlformats.org/drawingml/2006/main" xmlns:r="http://schemas.openxmlformats.org/officeDocument/2006/relationships" xmlns:p="http://schemas.openxmlformats.org/presentationml/2006/main">
   <p:cSld>
     <p:spTree>
@@ -25082,7 +24612,7 @@
           <a:p>
             <a:fld id="{157B8E69-23A9-4619-9CFE-E27BFD8A78F9}" type="slidenum">
               <a:rPr lang="en-US" smtClean="0"/>
-              <a:t>25</a:t>
+              <a:t>24</a:t>
             </a:fld>
             <a:endParaRPr lang="en-US"/>
           </a:p>
@@ -28167,148 +27697,10 @@
           <a:lstStyle/>
           <a:p>
             <a:r>
-              <a:rPr lang="en-US" dirty="0" smtClean="0"/>
-              <a:t>Course Details</a:t>
-            </a:r>
-            <a:endParaRPr lang="en-US" dirty="0"/>
-          </a:p>
-        </p:txBody>
-      </p:sp>
-      <p:sp>
-        <p:nvSpPr>
-          <p:cNvPr id="3" name="Content Placeholder 2"/>
-          <p:cNvSpPr>
-            <a:spLocks noGrp="1"/>
-          </p:cNvSpPr>
-          <p:nvPr>
-            <p:ph idx="1"/>
-          </p:nvPr>
-        </p:nvSpPr>
-        <p:spPr/>
-        <p:txBody>
-          <a:bodyPr/>
-          <a:lstStyle/>
-          <a:p>
-            <a:r>
-              <a:rPr lang="en-US" b="1" dirty="0" smtClean="0"/>
-              <a:t>Name</a:t>
-            </a:r>
-            <a:r>
-              <a:rPr lang="en-US" dirty="0" smtClean="0"/>
-              <a:t>: CS771 Introduction to Machine Learning</a:t>
-            </a:r>
-          </a:p>
-          <a:p>
-            <a:r>
-              <a:rPr lang="en-US" b="1" dirty="0" smtClean="0"/>
-              <a:t>Lectures</a:t>
-            </a:r>
-            <a:r>
-              <a:rPr lang="en-US" dirty="0" smtClean="0"/>
-              <a:t>: Mon, Wed, Fri, </a:t>
-            </a:r>
-            <a:r>
-              <a:rPr lang="en-US" dirty="0"/>
-              <a:t>6:30-7:30 </a:t>
-            </a:r>
-            <a:r>
-              <a:rPr lang="en-US" dirty="0" smtClean="0"/>
-              <a:t>PM RM101</a:t>
-            </a:r>
-          </a:p>
-          <a:p>
-            <a:r>
-              <a:rPr lang="en-US" b="1" dirty="0" smtClean="0"/>
+              <a:rPr lang="en-IN" dirty="0" smtClean="0"/>
               <a:t>Course Team</a:t>
             </a:r>
-            <a:r>
-              <a:rPr lang="en-US" dirty="0" smtClean="0"/>
-              <a:t>: </a:t>
-            </a:r>
-            <a:r>
-              <a:rPr lang="en-US" dirty="0"/>
-              <a:t>wait for next slide</a:t>
-            </a:r>
-            <a:endParaRPr lang="en-US" dirty="0" smtClean="0"/>
-          </a:p>
-          <a:p>
-            <a:r>
-              <a:rPr lang="en-US" b="1" dirty="0" smtClean="0"/>
-              <a:t>Course Website</a:t>
-            </a:r>
-            <a:r>
-              <a:rPr lang="en-US" dirty="0"/>
-              <a:t>: </a:t>
-            </a:r>
-            <a:r>
-              <a:rPr lang="en-US" dirty="0">
-                <a:hlinkClick r:id="rId2"/>
-              </a:rPr>
-              <a:t>https://</a:t>
-            </a:r>
-            <a:r>
-              <a:rPr lang="en-US" dirty="0" smtClean="0">
-                <a:hlinkClick r:id="rId2"/>
-              </a:rPr>
-              <a:t>tinyurl.com/ml19-20ww</a:t>
-            </a:r>
-            <a:endParaRPr lang="en-US" dirty="0" smtClean="0"/>
-          </a:p>
-          <a:p>
-            <a:r>
-              <a:rPr lang="en-US" b="1" dirty="0" smtClean="0"/>
-              <a:t>Piazza Website</a:t>
-            </a:r>
-            <a:r>
-              <a:rPr lang="en-US" dirty="0" smtClean="0"/>
-              <a:t>: </a:t>
-            </a:r>
-            <a:r>
-              <a:rPr lang="en-US" dirty="0">
-                <a:hlinkClick r:id="rId3"/>
-              </a:rPr>
-              <a:t>https://</a:t>
-            </a:r>
-            <a:r>
-              <a:rPr lang="en-US" dirty="0" smtClean="0">
-                <a:hlinkClick r:id="rId3"/>
-              </a:rPr>
-              <a:t>tinyurl.com/ml19-20wp</a:t>
-            </a:r>
-            <a:r>
-              <a:rPr lang="en-US" dirty="0" smtClean="0"/>
-              <a:t> (Enroll yourself!)</a:t>
-            </a:r>
-          </a:p>
-          <a:p>
-            <a:r>
-              <a:rPr lang="en-US" b="1" dirty="0" smtClean="0"/>
-              <a:t>Office hours</a:t>
-            </a:r>
-            <a:r>
-              <a:rPr lang="en-US" dirty="0" smtClean="0"/>
-              <a:t>: uploaded </a:t>
-            </a:r>
-            <a:r>
-              <a:rPr lang="en-US" dirty="0"/>
-              <a:t>on Piazza</a:t>
-            </a:r>
-            <a:br>
-              <a:rPr lang="en-US" dirty="0"/>
-            </a:br>
-            <a:r>
-              <a:rPr lang="en-US" dirty="0">
-                <a:hlinkClick r:id="rId4"/>
-              </a:rPr>
-              <a:t>https://</a:t>
-            </a:r>
-            <a:r>
-              <a:rPr lang="en-US" dirty="0" smtClean="0">
-                <a:hlinkClick r:id="rId4"/>
-              </a:rPr>
-              <a:t>piazza.com/iitk.ac.in/secondsemester2020/cs771/staff</a:t>
-            </a:r>
-            <a:endParaRPr lang="en-US" dirty="0"/>
+            <a:endParaRPr lang="en-IN" dirty="0"/>
           </a:p>
         </p:txBody>
       </p:sp>
@@ -28330,409 +27722,6 @@
             <a:fld id="{157B8E69-23A9-4619-9CFE-E27BFD8A78F9}" type="slidenum">
               <a:rPr lang="en-US" smtClean="0"/>
               <a:t>3</a:t>
-            </a:fld>
-            <a:endParaRPr lang="en-US"/>
-          </a:p>
-        </p:txBody>
-      </p:sp>
-    </p:spTree>
-    <p:extLst>
-      <p:ext uri="{BB962C8B-B14F-4D97-AF65-F5344CB8AC3E}">
-        <p14:creationId xmlns:p14="http://schemas.microsoft.com/office/powerpoint/2010/main" val="2170869476"/>
-      </p:ext>
-    </p:extLst>
-  </p:cSld>
-  <p:clrMapOvr>
-    <a:masterClrMapping/>
-  </p:clrMapOvr>
-  <p:timing>
-    <p:tnLst>
-      <p:par>
-        <p:cTn id="1" dur="indefinite" restart="never" nodeType="tmRoot">
-          <p:childTnLst>
-            <p:seq concurrent="1" nextAc="seek">
-              <p:cTn id="2" dur="indefinite" nodeType="mainSeq">
-                <p:childTnLst>
-                  <p:par>
-                    <p:cTn id="3" fill="hold">
-                      <p:stCondLst>
-                        <p:cond delay="indefinite"/>
-                      </p:stCondLst>
-                      <p:childTnLst>
-                        <p:par>
-                          <p:cTn id="4" fill="hold">
-                            <p:stCondLst>
-                              <p:cond delay="0"/>
-                            </p:stCondLst>
-                            <p:childTnLst>
-                              <p:par>
-                                <p:cTn id="5" presetID="1" presetClass="entr" presetSubtype="0" fill="hold" grpId="0" nodeType="clickEffect">
-                                  <p:stCondLst>
-                                    <p:cond delay="0"/>
-                                  </p:stCondLst>
-                                  <p:childTnLst>
-                                    <p:set>
-                                      <p:cBhvr>
-                                        <p:cTn id="6" dur="1" fill="hold">
-                                          <p:stCondLst>
-                                            <p:cond delay="0"/>
-                                          </p:stCondLst>
-                                        </p:cTn>
-                                        <p:tgtEl>
-                                          <p:spTgt spid="3">
-                                            <p:txEl>
-                                              <p:pRg st="0" end="0"/>
-                                            </p:txEl>
-                                          </p:spTgt>
-                                        </p:tgtEl>
-                                        <p:attrNameLst>
-                                          <p:attrName>style.visibility</p:attrName>
-                                        </p:attrNameLst>
-                                      </p:cBhvr>
-                                      <p:to>
-                                        <p:strVal val="visible"/>
-                                      </p:to>
-                                    </p:set>
-                                  </p:childTnLst>
-                                </p:cTn>
-                              </p:par>
-                            </p:childTnLst>
-                          </p:cTn>
-                        </p:par>
-                      </p:childTnLst>
-                    </p:cTn>
-                  </p:par>
-                  <p:par>
-                    <p:cTn id="7" fill="hold">
-                      <p:stCondLst>
-                        <p:cond delay="indefinite"/>
-                      </p:stCondLst>
-                      <p:childTnLst>
-                        <p:par>
-                          <p:cTn id="8" fill="hold">
-                            <p:stCondLst>
-                              <p:cond delay="0"/>
-                            </p:stCondLst>
-                            <p:childTnLst>
-                              <p:par>
-                                <p:cTn id="9" presetID="1" presetClass="entr" presetSubtype="0" fill="hold" grpId="0" nodeType="clickEffect">
-                                  <p:stCondLst>
-                                    <p:cond delay="0"/>
-                                  </p:stCondLst>
-                                  <p:childTnLst>
-                                    <p:set>
-                                      <p:cBhvr>
-                                        <p:cTn id="10" dur="1" fill="hold">
-                                          <p:stCondLst>
-                                            <p:cond delay="0"/>
-                                          </p:stCondLst>
-                                        </p:cTn>
-                                        <p:tgtEl>
-                                          <p:spTgt spid="3">
-                                            <p:txEl>
-                                              <p:pRg st="1" end="1"/>
-                                            </p:txEl>
-                                          </p:spTgt>
-                                        </p:tgtEl>
-                                        <p:attrNameLst>
-                                          <p:attrName>style.visibility</p:attrName>
-                                        </p:attrNameLst>
-                                      </p:cBhvr>
-                                      <p:to>
-                                        <p:strVal val="visible"/>
-                                      </p:to>
-                                    </p:set>
-                                  </p:childTnLst>
-                                </p:cTn>
-                              </p:par>
-                            </p:childTnLst>
-                          </p:cTn>
-                        </p:par>
-                      </p:childTnLst>
-                    </p:cTn>
-                  </p:par>
-                  <p:par>
-                    <p:cTn id="11" fill="hold">
-                      <p:stCondLst>
-                        <p:cond delay="indefinite"/>
-                      </p:stCondLst>
-                      <p:childTnLst>
-                        <p:par>
-                          <p:cTn id="12" fill="hold">
-                            <p:stCondLst>
-                              <p:cond delay="0"/>
-                            </p:stCondLst>
-                            <p:childTnLst>
-                              <p:par>
-                                <p:cTn id="13" presetID="1" presetClass="entr" presetSubtype="0" fill="hold" grpId="0" nodeType="clickEffect">
-                                  <p:stCondLst>
-                                    <p:cond delay="0"/>
-                                  </p:stCondLst>
-                                  <p:childTnLst>
-                                    <p:set>
-                                      <p:cBhvr>
-                                        <p:cTn id="14" dur="1" fill="hold">
-                                          <p:stCondLst>
-                                            <p:cond delay="0"/>
-                                          </p:stCondLst>
-                                        </p:cTn>
-                                        <p:tgtEl>
-                                          <p:spTgt spid="3">
-                                            <p:txEl>
-                                              <p:pRg st="2" end="2"/>
-                                            </p:txEl>
-                                          </p:spTgt>
-                                        </p:tgtEl>
-                                        <p:attrNameLst>
-                                          <p:attrName>style.visibility</p:attrName>
-                                        </p:attrNameLst>
-                                      </p:cBhvr>
-                                      <p:to>
-                                        <p:strVal val="visible"/>
-                                      </p:to>
-                                    </p:set>
-                                  </p:childTnLst>
-                                </p:cTn>
-                              </p:par>
-                            </p:childTnLst>
-                          </p:cTn>
-                        </p:par>
-                      </p:childTnLst>
-                    </p:cTn>
-                  </p:par>
-                  <p:par>
-                    <p:cTn id="15" fill="hold">
-                      <p:stCondLst>
-                        <p:cond delay="indefinite"/>
-                      </p:stCondLst>
-                      <p:childTnLst>
-                        <p:par>
-                          <p:cTn id="16" fill="hold">
-                            <p:stCondLst>
-                              <p:cond delay="0"/>
-                            </p:stCondLst>
-                            <p:childTnLst>
-                              <p:par>
-                                <p:cTn id="17" presetID="1" presetClass="entr" presetSubtype="0" fill="hold" grpId="0" nodeType="clickEffect">
-                                  <p:stCondLst>
-                                    <p:cond delay="0"/>
-                                  </p:stCondLst>
-                                  <p:childTnLst>
-                                    <p:set>
-                                      <p:cBhvr>
-                                        <p:cTn id="18" dur="1" fill="hold">
-                                          <p:stCondLst>
-                                            <p:cond delay="0"/>
-                                          </p:stCondLst>
-                                        </p:cTn>
-                                        <p:tgtEl>
-                                          <p:spTgt spid="3">
-                                            <p:txEl>
-                                              <p:pRg st="3" end="3"/>
-                                            </p:txEl>
-                                          </p:spTgt>
-                                        </p:tgtEl>
-                                        <p:attrNameLst>
-                                          <p:attrName>style.visibility</p:attrName>
-                                        </p:attrNameLst>
-                                      </p:cBhvr>
-                                      <p:to>
-                                        <p:strVal val="visible"/>
-                                      </p:to>
-                                    </p:set>
-                                  </p:childTnLst>
-                                </p:cTn>
-                              </p:par>
-                            </p:childTnLst>
-                          </p:cTn>
-                        </p:par>
-                      </p:childTnLst>
-                    </p:cTn>
-                  </p:par>
-                  <p:par>
-                    <p:cTn id="19" fill="hold">
-                      <p:stCondLst>
-                        <p:cond delay="indefinite"/>
-                      </p:stCondLst>
-                      <p:childTnLst>
-                        <p:par>
-                          <p:cTn id="20" fill="hold">
-                            <p:stCondLst>
-                              <p:cond delay="0"/>
-                            </p:stCondLst>
-                            <p:childTnLst>
-                              <p:par>
-                                <p:cTn id="21" presetID="1" presetClass="entr" presetSubtype="0" fill="hold" grpId="0" nodeType="clickEffect">
-                                  <p:stCondLst>
-                                    <p:cond delay="0"/>
-                                  </p:stCondLst>
-                                  <p:childTnLst>
-                                    <p:set>
-                                      <p:cBhvr>
-                                        <p:cTn id="22" dur="1" fill="hold">
-                                          <p:stCondLst>
-                                            <p:cond delay="0"/>
-                                          </p:stCondLst>
-                                        </p:cTn>
-                                        <p:tgtEl>
-                                          <p:spTgt spid="3">
-                                            <p:txEl>
-                                              <p:pRg st="4" end="4"/>
-                                            </p:txEl>
-                                          </p:spTgt>
-                                        </p:tgtEl>
-                                        <p:attrNameLst>
-                                          <p:attrName>style.visibility</p:attrName>
-                                        </p:attrNameLst>
-                                      </p:cBhvr>
-                                      <p:to>
-                                        <p:strVal val="visible"/>
-                                      </p:to>
-                                    </p:set>
-                                  </p:childTnLst>
-                                </p:cTn>
-                              </p:par>
-                            </p:childTnLst>
-                          </p:cTn>
-                        </p:par>
-                      </p:childTnLst>
-                    </p:cTn>
-                  </p:par>
-                  <p:par>
-                    <p:cTn id="23" fill="hold">
-                      <p:stCondLst>
-                        <p:cond delay="indefinite"/>
-                      </p:stCondLst>
-                      <p:childTnLst>
-                        <p:par>
-                          <p:cTn id="24" fill="hold">
-                            <p:stCondLst>
-                              <p:cond delay="0"/>
-                            </p:stCondLst>
-                            <p:childTnLst>
-                              <p:par>
-                                <p:cTn id="25" presetID="1" presetClass="entr" presetSubtype="0" fill="hold" grpId="0" nodeType="clickEffect">
-                                  <p:stCondLst>
-                                    <p:cond delay="0"/>
-                                  </p:stCondLst>
-                                  <p:childTnLst>
-                                    <p:set>
-                                      <p:cBhvr>
-                                        <p:cTn id="26" dur="1" fill="hold">
-                                          <p:stCondLst>
-                                            <p:cond delay="0"/>
-                                          </p:stCondLst>
-                                        </p:cTn>
-                                        <p:tgtEl>
-                                          <p:spTgt spid="3">
-                                            <p:txEl>
-                                              <p:pRg st="5" end="5"/>
-                                            </p:txEl>
-                                          </p:spTgt>
-                                        </p:tgtEl>
-                                        <p:attrNameLst>
-                                          <p:attrName>style.visibility</p:attrName>
-                                        </p:attrNameLst>
-                                      </p:cBhvr>
-                                      <p:to>
-                                        <p:strVal val="visible"/>
-                                      </p:to>
-                                    </p:set>
-                                  </p:childTnLst>
-                                </p:cTn>
-                              </p:par>
-                            </p:childTnLst>
-                          </p:cTn>
-                        </p:par>
-                      </p:childTnLst>
-                    </p:cTn>
-                  </p:par>
-                </p:childTnLst>
-              </p:cTn>
-              <p:prevCondLst>
-                <p:cond evt="onPrev" delay="0">
-                  <p:tgtEl>
-                    <p:sldTgt/>
-                  </p:tgtEl>
-                </p:cond>
-              </p:prevCondLst>
-              <p:nextCondLst>
-                <p:cond evt="onNext" delay="0">
-                  <p:tgtEl>
-                    <p:sldTgt/>
-                  </p:tgtEl>
-                </p:cond>
-              </p:nextCondLst>
-            </p:seq>
-          </p:childTnLst>
-        </p:cTn>
-      </p:par>
-    </p:tnLst>
-    <p:bldLst>
-      <p:bldP spid="3" grpId="0" build="p"/>
-    </p:bldLst>
-  </p:timing>
-</p:sld>
-</file>
-
-<file path=ppt/slides/slide4.xml><?xml version="1.0" encoding="utf-8"?>
-<p:sld xmlns:a="http://schemas.openxmlformats.org/drawingml/2006/main" xmlns:r="http://schemas.openxmlformats.org/officeDocument/2006/relationships" xmlns:p="http://schemas.openxmlformats.org/presentationml/2006/main">
-  <p:cSld>
-    <p:spTree>
-      <p:nvGrpSpPr>
-        <p:cNvPr id="1" name=""/>
-        <p:cNvGrpSpPr/>
-        <p:nvPr/>
-      </p:nvGrpSpPr>
-      <p:grpSpPr>
-        <a:xfrm>
-          <a:off x="0" y="0"/>
-          <a:ext cx="0" cy="0"/>
-          <a:chOff x="0" y="0"/>
-          <a:chExt cx="0" cy="0"/>
-        </a:xfrm>
-      </p:grpSpPr>
-      <p:sp>
-        <p:nvSpPr>
-          <p:cNvPr id="2" name="Title 1"/>
-          <p:cNvSpPr>
-            <a:spLocks noGrp="1"/>
-          </p:cNvSpPr>
-          <p:nvPr>
-            <p:ph type="title"/>
-          </p:nvPr>
-        </p:nvSpPr>
-        <p:spPr/>
-        <p:txBody>
-          <a:bodyPr/>
-          <a:lstStyle/>
-          <a:p>
-            <a:r>
-              <a:rPr lang="en-IN" dirty="0" smtClean="0"/>
-              <a:t>Course Team</a:t>
-            </a:r>
-            <a:endParaRPr lang="en-IN" dirty="0"/>
-          </a:p>
-        </p:txBody>
-      </p:sp>
-      <p:sp>
-        <p:nvSpPr>
-          <p:cNvPr id="4" name="Slide Number Placeholder 3"/>
-          <p:cNvSpPr>
-            <a:spLocks noGrp="1"/>
-          </p:cNvSpPr>
-          <p:nvPr>
-            <p:ph type="sldNum" sz="quarter" idx="12"/>
-          </p:nvPr>
-        </p:nvSpPr>
-        <p:spPr/>
-        <p:txBody>
-          <a:bodyPr/>
-          <a:lstStyle/>
-          <a:p>
-            <a:fld id="{157B8E69-23A9-4619-9CFE-E27BFD8A78F9}" type="slidenum">
-              <a:rPr lang="en-US" smtClean="0"/>
-              <a:t>4</a:t>
             </a:fld>
             <a:endParaRPr lang="en-US"/>
           </a:p>
@@ -29601,7 +28590,7 @@
 </p:sld>
 </file>
 
-<file path=ppt/slides/slide5.xml><?xml version="1.0" encoding="utf-8"?>
+<file path=ppt/slides/slide4.xml><?xml version="1.0" encoding="utf-8"?>
 <p:sld xmlns:a="http://schemas.openxmlformats.org/drawingml/2006/main" xmlns:r="http://schemas.openxmlformats.org/officeDocument/2006/relationships" xmlns:p="http://schemas.openxmlformats.org/presentationml/2006/main">
   <p:cSld>
     <p:spTree>
@@ -29658,7 +28647,7 @@
           <a:p>
             <a:fld id="{157B8E69-23A9-4619-9CFE-E27BFD8A78F9}" type="slidenum">
               <a:rPr lang="en-US" smtClean="0"/>
-              <a:t>5</a:t>
+              <a:t>4</a:t>
             </a:fld>
             <a:endParaRPr lang="en-US"/>
           </a:p>
@@ -30515,7 +29504,7 @@
 </p:sld>
 </file>
 
-<file path=ppt/slides/slide6.xml><?xml version="1.0" encoding="utf-8"?>
+<file path=ppt/slides/slide5.xml><?xml version="1.0" encoding="utf-8"?>
 <p:sld xmlns:a="http://schemas.openxmlformats.org/drawingml/2006/main" xmlns:r="http://schemas.openxmlformats.org/officeDocument/2006/relationships" xmlns:p="http://schemas.openxmlformats.org/presentationml/2006/main">
   <p:cSld>
     <p:spTree>
@@ -30572,7 +29561,7 @@
           <a:p>
             <a:fld id="{157B8E69-23A9-4619-9CFE-E27BFD8A78F9}" type="slidenum">
               <a:rPr lang="en-US" smtClean="0"/>
-              <a:t>6</a:t>
+              <a:t>5</a:t>
             </a:fld>
             <a:endParaRPr lang="en-US"/>
           </a:p>
@@ -31225,7 +30214,7 @@
 </p:sld>
 </file>
 
-<file path=ppt/slides/slide7.xml><?xml version="1.0" encoding="utf-8"?>
+<file path=ppt/slides/slide6.xml><?xml version="1.0" encoding="utf-8"?>
 <p:sld xmlns:a="http://schemas.openxmlformats.org/drawingml/2006/main" xmlns:r="http://schemas.openxmlformats.org/officeDocument/2006/relationships" xmlns:p="http://schemas.openxmlformats.org/presentationml/2006/main">
   <p:cSld>
     <p:spTree>
@@ -31379,7 +30368,7 @@
           <a:p>
             <a:fld id="{157B8E69-23A9-4619-9CFE-E27BFD8A78F9}" type="slidenum">
               <a:rPr lang="en-US" smtClean="0"/>
-              <a:t>7</a:t>
+              <a:t>6</a:t>
             </a:fld>
             <a:endParaRPr lang="en-US"/>
           </a:p>
@@ -31733,6 +30722,129 @@
 </p:sld>
 </file>
 
+<file path=ppt/slides/slide7.xml><?xml version="1.0" encoding="utf-8"?>
+<p:sld xmlns:a="http://schemas.openxmlformats.org/drawingml/2006/main" xmlns:r="http://schemas.openxmlformats.org/officeDocument/2006/relationships" xmlns:p="http://schemas.openxmlformats.org/presentationml/2006/main">
+  <p:cSld>
+    <p:spTree>
+      <p:nvGrpSpPr>
+        <p:cNvPr id="1" name=""/>
+        <p:cNvGrpSpPr/>
+        <p:nvPr/>
+      </p:nvGrpSpPr>
+      <p:grpSpPr>
+        <a:xfrm>
+          <a:off x="0" y="0"/>
+          <a:ext cx="0" cy="0"/>
+          <a:chOff x="0" y="0"/>
+          <a:chExt cx="0" cy="0"/>
+        </a:xfrm>
+      </p:grpSpPr>
+      <p:sp>
+        <p:nvSpPr>
+          <p:cNvPr id="2" name="Title 1"/>
+          <p:cNvSpPr>
+            <a:spLocks noGrp="1"/>
+          </p:cNvSpPr>
+          <p:nvPr>
+            <p:ph type="title"/>
+          </p:nvPr>
+        </p:nvSpPr>
+        <p:spPr/>
+        <p:txBody>
+          <a:bodyPr/>
+          <a:lstStyle/>
+          <a:p>
+            <a:r>
+              <a:rPr lang="en-IN" dirty="0" smtClean="0"/>
+              <a:t>Grading Scheme</a:t>
+            </a:r>
+            <a:endParaRPr lang="en-IN" dirty="0"/>
+          </a:p>
+        </p:txBody>
+      </p:sp>
+      <p:sp>
+        <p:nvSpPr>
+          <p:cNvPr id="3" name="Content Placeholder 2"/>
+          <p:cNvSpPr>
+            <a:spLocks noGrp="1"/>
+          </p:cNvSpPr>
+          <p:nvPr>
+            <p:ph idx="1"/>
+          </p:nvPr>
+        </p:nvSpPr>
+        <p:spPr/>
+        <p:txBody>
+          <a:bodyPr/>
+          <a:lstStyle/>
+          <a:p>
+            <a:r>
+              <a:rPr lang="en-IN" dirty="0"/>
+              <a:t>Quizzes – 20%</a:t>
+            </a:r>
+          </a:p>
+          <a:p>
+            <a:r>
+              <a:rPr lang="en-IN" dirty="0" smtClean="0"/>
+              <a:t>Mini-projects – 30%</a:t>
+            </a:r>
+          </a:p>
+          <a:p>
+            <a:r>
+              <a:rPr lang="en-IN" dirty="0" smtClean="0"/>
+              <a:t>Mid-semester Exam – 20%</a:t>
+            </a:r>
+          </a:p>
+          <a:p>
+            <a:r>
+              <a:rPr lang="en-IN" dirty="0" smtClean="0"/>
+              <a:t>End-semester Exam – 30%</a:t>
+            </a:r>
+          </a:p>
+        </p:txBody>
+      </p:sp>
+      <p:sp>
+        <p:nvSpPr>
+          <p:cNvPr id="4" name="Slide Number Placeholder 3"/>
+          <p:cNvSpPr>
+            <a:spLocks noGrp="1"/>
+          </p:cNvSpPr>
+          <p:nvPr>
+            <p:ph type="sldNum" sz="quarter" idx="12"/>
+          </p:nvPr>
+        </p:nvSpPr>
+        <p:spPr/>
+        <p:txBody>
+          <a:bodyPr/>
+          <a:lstStyle/>
+          <a:p>
+            <a:fld id="{157B8E69-23A9-4619-9CFE-E27BFD8A78F9}" type="slidenum">
+              <a:rPr lang="en-US" smtClean="0"/>
+              <a:t>7</a:t>
+            </a:fld>
+            <a:endParaRPr lang="en-US"/>
+          </a:p>
+        </p:txBody>
+      </p:sp>
+    </p:spTree>
+    <p:extLst>
+      <p:ext uri="{BB962C8B-B14F-4D97-AF65-F5344CB8AC3E}">
+        <p14:creationId xmlns:p14="http://schemas.microsoft.com/office/powerpoint/2010/main" val="4138670744"/>
+      </p:ext>
+    </p:extLst>
+  </p:cSld>
+  <p:clrMapOvr>
+    <a:masterClrMapping/>
+  </p:clrMapOvr>
+  <p:timing>
+    <p:tnLst>
+      <p:par>
+        <p:cTn id="1" dur="indefinite" restart="never" nodeType="tmRoot"/>
+      </p:par>
+    </p:tnLst>
+  </p:timing>
+</p:sld>
+</file>
+
 <file path=ppt/slides/slide8.xml><?xml version="1.0" encoding="utf-8"?>
 <p:sld xmlns:a="http://schemas.openxmlformats.org/drawingml/2006/main" xmlns:r="http://schemas.openxmlformats.org/officeDocument/2006/relationships" xmlns:p="http://schemas.openxmlformats.org/presentationml/2006/main">
   <p:cSld>
@@ -31767,129 +30879,6 @@
           <a:p>
             <a:r>
               <a:rPr lang="en-IN" dirty="0" smtClean="0"/>
-              <a:t>Grading Scheme</a:t>
-            </a:r>
-            <a:endParaRPr lang="en-IN" dirty="0"/>
-          </a:p>
-        </p:txBody>
-      </p:sp>
-      <p:sp>
-        <p:nvSpPr>
-          <p:cNvPr id="3" name="Content Placeholder 2"/>
-          <p:cNvSpPr>
-            <a:spLocks noGrp="1"/>
-          </p:cNvSpPr>
-          <p:nvPr>
-            <p:ph idx="1"/>
-          </p:nvPr>
-        </p:nvSpPr>
-        <p:spPr/>
-        <p:txBody>
-          <a:bodyPr/>
-          <a:lstStyle/>
-          <a:p>
-            <a:r>
-              <a:rPr lang="en-IN" dirty="0"/>
-              <a:t>Quizzes – 20%</a:t>
-            </a:r>
-          </a:p>
-          <a:p>
-            <a:r>
-              <a:rPr lang="en-IN" dirty="0" smtClean="0"/>
-              <a:t>Mini-projects – 30%</a:t>
-            </a:r>
-          </a:p>
-          <a:p>
-            <a:r>
-              <a:rPr lang="en-IN" dirty="0" smtClean="0"/>
-              <a:t>Mid-semester Exam – 20%</a:t>
-            </a:r>
-          </a:p>
-          <a:p>
-            <a:r>
-              <a:rPr lang="en-IN" dirty="0" smtClean="0"/>
-              <a:t>End-semester Exam – 30%</a:t>
-            </a:r>
-          </a:p>
-        </p:txBody>
-      </p:sp>
-      <p:sp>
-        <p:nvSpPr>
-          <p:cNvPr id="4" name="Slide Number Placeholder 3"/>
-          <p:cNvSpPr>
-            <a:spLocks noGrp="1"/>
-          </p:cNvSpPr>
-          <p:nvPr>
-            <p:ph type="sldNum" sz="quarter" idx="12"/>
-          </p:nvPr>
-        </p:nvSpPr>
-        <p:spPr/>
-        <p:txBody>
-          <a:bodyPr/>
-          <a:lstStyle/>
-          <a:p>
-            <a:fld id="{157B8E69-23A9-4619-9CFE-E27BFD8A78F9}" type="slidenum">
-              <a:rPr lang="en-US" smtClean="0"/>
-              <a:t>8</a:t>
-            </a:fld>
-            <a:endParaRPr lang="en-US"/>
-          </a:p>
-        </p:txBody>
-      </p:sp>
-    </p:spTree>
-    <p:extLst>
-      <p:ext uri="{BB962C8B-B14F-4D97-AF65-F5344CB8AC3E}">
-        <p14:creationId xmlns:p14="http://schemas.microsoft.com/office/powerpoint/2010/main" val="4138670744"/>
-      </p:ext>
-    </p:extLst>
-  </p:cSld>
-  <p:clrMapOvr>
-    <a:masterClrMapping/>
-  </p:clrMapOvr>
-  <p:timing>
-    <p:tnLst>
-      <p:par>
-        <p:cTn id="1" dur="indefinite" restart="never" nodeType="tmRoot"/>
-      </p:par>
-    </p:tnLst>
-  </p:timing>
-</p:sld>
-</file>
-
-<file path=ppt/slides/slide9.xml><?xml version="1.0" encoding="utf-8"?>
-<p:sld xmlns:a="http://schemas.openxmlformats.org/drawingml/2006/main" xmlns:r="http://schemas.openxmlformats.org/officeDocument/2006/relationships" xmlns:p="http://schemas.openxmlformats.org/presentationml/2006/main">
-  <p:cSld>
-    <p:spTree>
-      <p:nvGrpSpPr>
-        <p:cNvPr id="1" name=""/>
-        <p:cNvGrpSpPr/>
-        <p:nvPr/>
-      </p:nvGrpSpPr>
-      <p:grpSpPr>
-        <a:xfrm>
-          <a:off x="0" y="0"/>
-          <a:ext cx="0" cy="0"/>
-          <a:chOff x="0" y="0"/>
-          <a:chExt cx="0" cy="0"/>
-        </a:xfrm>
-      </p:grpSpPr>
-      <p:sp>
-        <p:nvSpPr>
-          <p:cNvPr id="2" name="Title 1"/>
-          <p:cNvSpPr>
-            <a:spLocks noGrp="1"/>
-          </p:cNvSpPr>
-          <p:nvPr>
-            <p:ph type="title"/>
-          </p:nvPr>
-        </p:nvSpPr>
-        <p:spPr/>
-        <p:txBody>
-          <a:bodyPr/>
-          <a:lstStyle/>
-          <a:p>
-            <a:r>
-              <a:rPr lang="en-IN" dirty="0" smtClean="0"/>
               <a:t>Quizzes – 20%</a:t>
             </a:r>
             <a:endParaRPr lang="en-IN" dirty="0"/>
@@ -31985,7 +30974,7 @@
           <a:p>
             <a:fld id="{157B8E69-23A9-4619-9CFE-E27BFD8A78F9}" type="slidenum">
               <a:rPr lang="en-US" smtClean="0"/>
-              <a:t>9</a:t>
+              <a:t>8</a:t>
             </a:fld>
             <a:endParaRPr lang="en-US"/>
           </a:p>
@@ -32283,6 +31272,656 @@
                                           <p:spTgt spid="3">
                                             <p:txEl>
                                               <p:pRg st="5" end="5"/>
+                                            </p:txEl>
+                                          </p:spTgt>
+                                        </p:tgtEl>
+                                        <p:attrNameLst>
+                                          <p:attrName>style.visibility</p:attrName>
+                                        </p:attrNameLst>
+                                      </p:cBhvr>
+                                      <p:to>
+                                        <p:strVal val="visible"/>
+                                      </p:to>
+                                    </p:set>
+                                  </p:childTnLst>
+                                </p:cTn>
+                              </p:par>
+                            </p:childTnLst>
+                          </p:cTn>
+                        </p:par>
+                      </p:childTnLst>
+                    </p:cTn>
+                  </p:par>
+                </p:childTnLst>
+              </p:cTn>
+              <p:prevCondLst>
+                <p:cond evt="onPrev" delay="0">
+                  <p:tgtEl>
+                    <p:sldTgt/>
+                  </p:tgtEl>
+                </p:cond>
+              </p:prevCondLst>
+              <p:nextCondLst>
+                <p:cond evt="onNext" delay="0">
+                  <p:tgtEl>
+                    <p:sldTgt/>
+                  </p:tgtEl>
+                </p:cond>
+              </p:nextCondLst>
+            </p:seq>
+          </p:childTnLst>
+        </p:cTn>
+      </p:par>
+    </p:tnLst>
+    <p:bldLst>
+      <p:bldP spid="3" grpId="0" build="p"/>
+    </p:bldLst>
+  </p:timing>
+</p:sld>
+</file>
+
+<file path=ppt/slides/slide9.xml><?xml version="1.0" encoding="utf-8"?>
+<p:sld xmlns:a="http://schemas.openxmlformats.org/drawingml/2006/main" xmlns:r="http://schemas.openxmlformats.org/officeDocument/2006/relationships" xmlns:p="http://schemas.openxmlformats.org/presentationml/2006/main">
+  <p:cSld>
+    <p:spTree>
+      <p:nvGrpSpPr>
+        <p:cNvPr id="1" name=""/>
+        <p:cNvGrpSpPr/>
+        <p:nvPr/>
+      </p:nvGrpSpPr>
+      <p:grpSpPr>
+        <a:xfrm>
+          <a:off x="0" y="0"/>
+          <a:ext cx="0" cy="0"/>
+          <a:chOff x="0" y="0"/>
+          <a:chExt cx="0" cy="0"/>
+        </a:xfrm>
+      </p:grpSpPr>
+      <p:sp>
+        <p:nvSpPr>
+          <p:cNvPr id="2" name="Title 1"/>
+          <p:cNvSpPr>
+            <a:spLocks noGrp="1"/>
+          </p:cNvSpPr>
+          <p:nvPr>
+            <p:ph type="title"/>
+          </p:nvPr>
+        </p:nvSpPr>
+        <p:spPr/>
+        <p:txBody>
+          <a:bodyPr/>
+          <a:lstStyle/>
+          <a:p>
+            <a:r>
+              <a:rPr lang="en-IN" dirty="0" smtClean="0"/>
+              <a:t>Mini-projects (assignments) – 30%</a:t>
+            </a:r>
+            <a:endParaRPr lang="en-IN" dirty="0"/>
+          </a:p>
+        </p:txBody>
+      </p:sp>
+      <p:sp>
+        <p:nvSpPr>
+          <p:cNvPr id="3" name="Content Placeholder 2"/>
+          <p:cNvSpPr>
+            <a:spLocks noGrp="1"/>
+          </p:cNvSpPr>
+          <p:nvPr>
+            <p:ph idx="1"/>
+          </p:nvPr>
+        </p:nvSpPr>
+        <p:spPr>
+          <a:xfrm>
+            <a:off x="253354" y="1111624"/>
+            <a:ext cx="11600328" cy="5746376"/>
+          </a:xfrm>
+        </p:spPr>
+        <p:txBody>
+          <a:bodyPr>
+            <a:normAutofit/>
+          </a:bodyPr>
+          <a:lstStyle/>
+          <a:p>
+            <a:r>
+              <a:rPr lang="en-IN" dirty="0" smtClean="0"/>
+              <a:t>Three (3) mini projects to be done (weightages to be decided)</a:t>
+            </a:r>
+          </a:p>
+          <a:p>
+            <a:pPr lvl="1"/>
+            <a:r>
+              <a:rPr lang="en-IN" dirty="0" smtClean="0"/>
+              <a:t>Replaces the single monolith project in previous offerings of CS771</a:t>
+            </a:r>
+          </a:p>
+          <a:p>
+            <a:r>
+              <a:rPr lang="en-IN" dirty="0" smtClean="0"/>
+              <a:t>Mini-projects to be done in groups of five (5) students each</a:t>
+            </a:r>
+          </a:p>
+          <a:p>
+            <a:r>
+              <a:rPr lang="en-IN" dirty="0" smtClean="0"/>
+              <a:t>Start forming your group today</a:t>
+            </a:r>
+          </a:p>
+          <a:p>
+            <a:pPr lvl="1"/>
+            <a:r>
+              <a:rPr lang="en-IN" dirty="0" smtClean="0"/>
+              <a:t>Will ask you to submit group details once add-drop is over</a:t>
+            </a:r>
+          </a:p>
+          <a:p>
+            <a:pPr lvl="1"/>
+            <a:r>
+              <a:rPr lang="en-IN" dirty="0" smtClean="0"/>
+              <a:t>Groups can only contain registered students (no auditors)</a:t>
+            </a:r>
+          </a:p>
+          <a:p>
+            <a:r>
+              <a:rPr lang="en-IN" dirty="0" smtClean="0"/>
+              <a:t>Will have 1-2 weeks to finish each mini-project</a:t>
+            </a:r>
+          </a:p>
+          <a:p>
+            <a:r>
+              <a:rPr lang="en-IN" dirty="0" smtClean="0"/>
+              <a:t>Submission will include code + report</a:t>
+            </a:r>
+          </a:p>
+          <a:p>
+            <a:r>
+              <a:rPr lang="en-IN" dirty="0" smtClean="0"/>
+              <a:t>Code should be in Python – start learning Python today</a:t>
+            </a:r>
+          </a:p>
+          <a:p>
+            <a:r>
+              <a:rPr lang="en-IN" dirty="0" smtClean="0"/>
+              <a:t>Report must be in </a:t>
+            </a:r>
+            <a:r>
+              <a:rPr lang="en-IN" dirty="0" err="1" smtClean="0"/>
+              <a:t>LaTeX</a:t>
+            </a:r>
+            <a:r>
+              <a:rPr lang="en-IN" dirty="0" smtClean="0"/>
+              <a:t> – start learning </a:t>
+            </a:r>
+            <a:r>
+              <a:rPr lang="en-IN" dirty="0" err="1" smtClean="0"/>
+              <a:t>LaTeX</a:t>
+            </a:r>
+            <a:r>
+              <a:rPr lang="en-IN" dirty="0" smtClean="0"/>
+              <a:t> today</a:t>
+            </a:r>
+          </a:p>
+          <a:p>
+            <a:endParaRPr lang="en-IN" dirty="0"/>
+          </a:p>
+        </p:txBody>
+      </p:sp>
+      <p:sp>
+        <p:nvSpPr>
+          <p:cNvPr id="4" name="Slide Number Placeholder 3"/>
+          <p:cNvSpPr>
+            <a:spLocks noGrp="1"/>
+          </p:cNvSpPr>
+          <p:nvPr>
+            <p:ph type="sldNum" sz="quarter" idx="12"/>
+          </p:nvPr>
+        </p:nvSpPr>
+        <p:spPr/>
+        <p:txBody>
+          <a:bodyPr/>
+          <a:lstStyle/>
+          <a:p>
+            <a:fld id="{157B8E69-23A9-4619-9CFE-E27BFD8A78F9}" type="slidenum">
+              <a:rPr lang="en-US" smtClean="0"/>
+              <a:t>9</a:t>
+            </a:fld>
+            <a:endParaRPr lang="en-US"/>
+          </a:p>
+        </p:txBody>
+      </p:sp>
+    </p:spTree>
+    <p:extLst>
+      <p:ext uri="{BB962C8B-B14F-4D97-AF65-F5344CB8AC3E}">
+        <p14:creationId xmlns:p14="http://schemas.microsoft.com/office/powerpoint/2010/main" val="1385677891"/>
+      </p:ext>
+    </p:extLst>
+  </p:cSld>
+  <p:clrMapOvr>
+    <a:masterClrMapping/>
+  </p:clrMapOvr>
+  <p:timing>
+    <p:tnLst>
+      <p:par>
+        <p:cTn id="1" dur="indefinite" restart="never" nodeType="tmRoot">
+          <p:childTnLst>
+            <p:seq concurrent="1" nextAc="seek">
+              <p:cTn id="2" dur="indefinite" nodeType="mainSeq">
+                <p:childTnLst>
+                  <p:par>
+                    <p:cTn id="3" fill="hold">
+                      <p:stCondLst>
+                        <p:cond delay="indefinite"/>
+                      </p:stCondLst>
+                      <p:childTnLst>
+                        <p:par>
+                          <p:cTn id="4" fill="hold">
+                            <p:stCondLst>
+                              <p:cond delay="0"/>
+                            </p:stCondLst>
+                            <p:childTnLst>
+                              <p:par>
+                                <p:cTn id="5" presetID="1" presetClass="entr" presetSubtype="0" fill="hold" grpId="0" nodeType="clickEffect">
+                                  <p:stCondLst>
+                                    <p:cond delay="0"/>
+                                  </p:stCondLst>
+                                  <p:childTnLst>
+                                    <p:set>
+                                      <p:cBhvr>
+                                        <p:cTn id="6" dur="1" fill="hold">
+                                          <p:stCondLst>
+                                            <p:cond delay="0"/>
+                                          </p:stCondLst>
+                                        </p:cTn>
+                                        <p:tgtEl>
+                                          <p:spTgt spid="3">
+                                            <p:txEl>
+                                              <p:pRg st="0" end="0"/>
+                                            </p:txEl>
+                                          </p:spTgt>
+                                        </p:tgtEl>
+                                        <p:attrNameLst>
+                                          <p:attrName>style.visibility</p:attrName>
+                                        </p:attrNameLst>
+                                      </p:cBhvr>
+                                      <p:to>
+                                        <p:strVal val="visible"/>
+                                      </p:to>
+                                    </p:set>
+                                  </p:childTnLst>
+                                </p:cTn>
+                              </p:par>
+                              <p:par>
+                                <p:cTn id="7" presetID="1" presetClass="entr" presetSubtype="0" fill="hold" grpId="0" nodeType="withEffect">
+                                  <p:stCondLst>
+                                    <p:cond delay="0"/>
+                                  </p:stCondLst>
+                                  <p:childTnLst>
+                                    <p:set>
+                                      <p:cBhvr>
+                                        <p:cTn id="8" dur="1" fill="hold">
+                                          <p:stCondLst>
+                                            <p:cond delay="0"/>
+                                          </p:stCondLst>
+                                        </p:cTn>
+                                        <p:tgtEl>
+                                          <p:spTgt spid="3">
+                                            <p:txEl>
+                                              <p:pRg st="1" end="1"/>
+                                            </p:txEl>
+                                          </p:spTgt>
+                                        </p:tgtEl>
+                                        <p:attrNameLst>
+                                          <p:attrName>style.visibility</p:attrName>
+                                        </p:attrNameLst>
+                                      </p:cBhvr>
+                                      <p:to>
+                                        <p:strVal val="visible"/>
+                                      </p:to>
+                                    </p:set>
+                                  </p:childTnLst>
+                                </p:cTn>
+                              </p:par>
+                            </p:childTnLst>
+                          </p:cTn>
+                        </p:par>
+                      </p:childTnLst>
+                    </p:cTn>
+                  </p:par>
+                  <p:par>
+                    <p:cTn id="9" fill="hold">
+                      <p:stCondLst>
+                        <p:cond delay="indefinite"/>
+                      </p:stCondLst>
+                      <p:childTnLst>
+                        <p:par>
+                          <p:cTn id="10" fill="hold">
+                            <p:stCondLst>
+                              <p:cond delay="0"/>
+                            </p:stCondLst>
+                            <p:childTnLst>
+                              <p:par>
+                                <p:cTn id="11" presetID="1" presetClass="entr" presetSubtype="0" fill="hold" grpId="0" nodeType="clickEffect">
+                                  <p:stCondLst>
+                                    <p:cond delay="0"/>
+                                  </p:stCondLst>
+                                  <p:childTnLst>
+                                    <p:set>
+                                      <p:cBhvr>
+                                        <p:cTn id="12" dur="1" fill="hold">
+                                          <p:stCondLst>
+                                            <p:cond delay="0"/>
+                                          </p:stCondLst>
+                                        </p:cTn>
+                                        <p:tgtEl>
+                                          <p:spTgt spid="3">
+                                            <p:txEl>
+                                              <p:pRg st="2" end="2"/>
+                                            </p:txEl>
+                                          </p:spTgt>
+                                        </p:tgtEl>
+                                        <p:attrNameLst>
+                                          <p:attrName>style.visibility</p:attrName>
+                                        </p:attrNameLst>
+                                      </p:cBhvr>
+                                      <p:to>
+                                        <p:strVal val="visible"/>
+                                      </p:to>
+                                    </p:set>
+                                  </p:childTnLst>
+                                </p:cTn>
+                              </p:par>
+                            </p:childTnLst>
+                          </p:cTn>
+                        </p:par>
+                      </p:childTnLst>
+                    </p:cTn>
+                  </p:par>
+                  <p:par>
+                    <p:cTn id="13" fill="hold">
+                      <p:stCondLst>
+                        <p:cond delay="indefinite"/>
+                      </p:stCondLst>
+                      <p:childTnLst>
+                        <p:par>
+                          <p:cTn id="14" fill="hold">
+                            <p:stCondLst>
+                              <p:cond delay="0"/>
+                            </p:stCondLst>
+                            <p:childTnLst>
+                              <p:par>
+                                <p:cTn id="15" presetID="1" presetClass="entr" presetSubtype="0" fill="hold" grpId="0" nodeType="clickEffect">
+                                  <p:stCondLst>
+                                    <p:cond delay="0"/>
+                                  </p:stCondLst>
+                                  <p:childTnLst>
+                                    <p:set>
+                                      <p:cBhvr>
+                                        <p:cTn id="16" dur="1" fill="hold">
+                                          <p:stCondLst>
+                                            <p:cond delay="0"/>
+                                          </p:stCondLst>
+                                        </p:cTn>
+                                        <p:tgtEl>
+                                          <p:spTgt spid="3">
+                                            <p:txEl>
+                                              <p:pRg st="3" end="3"/>
+                                            </p:txEl>
+                                          </p:spTgt>
+                                        </p:tgtEl>
+                                        <p:attrNameLst>
+                                          <p:attrName>style.visibility</p:attrName>
+                                        </p:attrNameLst>
+                                      </p:cBhvr>
+                                      <p:to>
+                                        <p:strVal val="visible"/>
+                                      </p:to>
+                                    </p:set>
+                                  </p:childTnLst>
+                                </p:cTn>
+                              </p:par>
+                              <p:par>
+                                <p:cTn id="17" presetID="1" presetClass="entr" presetSubtype="0" fill="hold" grpId="0" nodeType="withEffect">
+                                  <p:stCondLst>
+                                    <p:cond delay="0"/>
+                                  </p:stCondLst>
+                                  <p:childTnLst>
+                                    <p:set>
+                                      <p:cBhvr>
+                                        <p:cTn id="18" dur="1" fill="hold">
+                                          <p:stCondLst>
+                                            <p:cond delay="0"/>
+                                          </p:stCondLst>
+                                        </p:cTn>
+                                        <p:tgtEl>
+                                          <p:spTgt spid="3">
+                                            <p:txEl>
+                                              <p:pRg st="4" end="4"/>
+                                            </p:txEl>
+                                          </p:spTgt>
+                                        </p:tgtEl>
+                                        <p:attrNameLst>
+                                          <p:attrName>style.visibility</p:attrName>
+                                        </p:attrNameLst>
+                                      </p:cBhvr>
+                                      <p:to>
+                                        <p:strVal val="visible"/>
+                                      </p:to>
+                                    </p:set>
+                                  </p:childTnLst>
+                                </p:cTn>
+                              </p:par>
+                              <p:par>
+                                <p:cTn id="19" presetID="1" presetClass="entr" presetSubtype="0" fill="hold" grpId="0" nodeType="withEffect">
+                                  <p:stCondLst>
+                                    <p:cond delay="0"/>
+                                  </p:stCondLst>
+                                  <p:childTnLst>
+                                    <p:set>
+                                      <p:cBhvr>
+                                        <p:cTn id="20" dur="1" fill="hold">
+                                          <p:stCondLst>
+                                            <p:cond delay="0"/>
+                                          </p:stCondLst>
+                                        </p:cTn>
+                                        <p:tgtEl>
+                                          <p:spTgt spid="3">
+                                            <p:txEl>
+                                              <p:pRg st="5" end="5"/>
+                                            </p:txEl>
+                                          </p:spTgt>
+                                        </p:tgtEl>
+                                        <p:attrNameLst>
+                                          <p:attrName>style.visibility</p:attrName>
+                                        </p:attrNameLst>
+                                      </p:cBhvr>
+                                      <p:to>
+                                        <p:strVal val="visible"/>
+                                      </p:to>
+                                    </p:set>
+                                  </p:childTnLst>
+                                </p:cTn>
+                              </p:par>
+                            </p:childTnLst>
+                          </p:cTn>
+                        </p:par>
+                      </p:childTnLst>
+                    </p:cTn>
+                  </p:par>
+                  <p:par>
+                    <p:cTn id="21" fill="hold">
+                      <p:stCondLst>
+                        <p:cond delay="indefinite"/>
+                      </p:stCondLst>
+                      <p:childTnLst>
+                        <p:par>
+                          <p:cTn id="22" fill="hold">
+                            <p:stCondLst>
+                              <p:cond delay="0"/>
+                            </p:stCondLst>
+                            <p:childTnLst>
+                              <p:par>
+                                <p:cTn id="23" presetID="1" presetClass="entr" presetSubtype="0" fill="hold" grpId="0" nodeType="clickEffect">
+                                  <p:stCondLst>
+                                    <p:cond delay="0"/>
+                                  </p:stCondLst>
+                                  <p:childTnLst>
+                                    <p:set>
+                                      <p:cBhvr>
+                                        <p:cTn id="24" dur="1" fill="hold">
+                                          <p:stCondLst>
+                                            <p:cond delay="0"/>
+                                          </p:stCondLst>
+                                        </p:cTn>
+                                        <p:tgtEl>
+                                          <p:spTgt spid="3">
+                                            <p:txEl>
+                                              <p:pRg st="6" end="6"/>
+                                            </p:txEl>
+                                          </p:spTgt>
+                                        </p:tgtEl>
+                                        <p:attrNameLst>
+                                          <p:attrName>style.visibility</p:attrName>
+                                        </p:attrNameLst>
+                                      </p:cBhvr>
+                                      <p:to>
+                                        <p:strVal val="visible"/>
+                                      </p:to>
+                                    </p:set>
+                                  </p:childTnLst>
+                                </p:cTn>
+                              </p:par>
+                            </p:childTnLst>
+                          </p:cTn>
+                        </p:par>
+                      </p:childTnLst>
+                    </p:cTn>
+                  </p:par>
+                  <p:par>
+                    <p:cTn id="25" fill="hold">
+                      <p:stCondLst>
+                        <p:cond delay="indefinite"/>
+                      </p:stCondLst>
+                      <p:childTnLst>
+                        <p:par>
+                          <p:cTn id="26" fill="hold">
+                            <p:stCondLst>
+                              <p:cond delay="0"/>
+                            </p:stCondLst>
+                            <p:childTnLst>
+                              <p:par>
+                                <p:cTn id="27" presetID="1" presetClass="entr" presetSubtype="0" fill="hold" grpId="0" nodeType="clickEffect">
+                                  <p:stCondLst>
+                                    <p:cond delay="0"/>
+                                  </p:stCondLst>
+                                  <p:childTnLst>
+                                    <p:set>
+                                      <p:cBhvr>
+                                        <p:cTn id="28" dur="1" fill="hold">
+                                          <p:stCondLst>
+                                            <p:cond delay="0"/>
+                                          </p:stCondLst>
+                                        </p:cTn>
+                                        <p:tgtEl>
+                                          <p:spTgt spid="3">
+                                            <p:txEl>
+                                              <p:pRg st="7" end="7"/>
+                                            </p:txEl>
+                                          </p:spTgt>
+                                        </p:tgtEl>
+                                        <p:attrNameLst>
+                                          <p:attrName>style.visibility</p:attrName>
+                                        </p:attrNameLst>
+                                      </p:cBhvr>
+                                      <p:to>
+                                        <p:strVal val="visible"/>
+                                      </p:to>
+                                    </p:set>
+                                  </p:childTnLst>
+                                </p:cTn>
+                              </p:par>
+                            </p:childTnLst>
+                          </p:cTn>
+                        </p:par>
+                      </p:childTnLst>
+                    </p:cTn>
+                  </p:par>
+                  <p:par>
+                    <p:cTn id="29" fill="hold">
+                      <p:stCondLst>
+                        <p:cond delay="indefinite"/>
+                      </p:stCondLst>
+                      <p:childTnLst>
+                        <p:par>
+                          <p:cTn id="30" fill="hold">
+                            <p:stCondLst>
+                              <p:cond delay="0"/>
+                            </p:stCondLst>
+                            <p:childTnLst>
+                              <p:par>
+                                <p:cTn id="31" presetID="1" presetClass="entr" presetSubtype="0" fill="hold" grpId="0" nodeType="clickEffect">
+                                  <p:stCondLst>
+                                    <p:cond delay="0"/>
+                                  </p:stCondLst>
+                                  <p:childTnLst>
+                                    <p:set>
+                                      <p:cBhvr>
+                                        <p:cTn id="32" dur="1" fill="hold">
+                                          <p:stCondLst>
+                                            <p:cond delay="0"/>
+                                          </p:stCondLst>
+                                        </p:cTn>
+                                        <p:tgtEl>
+                                          <p:spTgt spid="3">
+                                            <p:txEl>
+                                              <p:pRg st="8" end="8"/>
+                                            </p:txEl>
+                                          </p:spTgt>
+                                        </p:tgtEl>
+                                        <p:attrNameLst>
+                                          <p:attrName>style.visibility</p:attrName>
+                                        </p:attrNameLst>
+                                      </p:cBhvr>
+                                      <p:to>
+                                        <p:strVal val="visible"/>
+                                      </p:to>
+                                    </p:set>
+                                  </p:childTnLst>
+                                </p:cTn>
+                              </p:par>
+                            </p:childTnLst>
+                          </p:cTn>
+                        </p:par>
+                      </p:childTnLst>
+                    </p:cTn>
+                  </p:par>
+                  <p:par>
+                    <p:cTn id="33" fill="hold">
+                      <p:stCondLst>
+                        <p:cond delay="indefinite"/>
+                      </p:stCondLst>
+                      <p:childTnLst>
+                        <p:par>
+                          <p:cTn id="34" fill="hold">
+                            <p:stCondLst>
+                              <p:cond delay="0"/>
+                            </p:stCondLst>
+                            <p:childTnLst>
+                              <p:par>
+                                <p:cTn id="35" presetID="1" presetClass="entr" presetSubtype="0" fill="hold" grpId="0" nodeType="clickEffect">
+                                  <p:stCondLst>
+                                    <p:cond delay="0"/>
+                                  </p:stCondLst>
+                                  <p:childTnLst>
+                                    <p:set>
+                                      <p:cBhvr>
+                                        <p:cTn id="36" dur="1" fill="hold">
+                                          <p:stCondLst>
+                                            <p:cond delay="0"/>
+                                          </p:stCondLst>
+                                        </p:cTn>
+                                        <p:tgtEl>
+                                          <p:spTgt spid="3">
+                                            <p:txEl>
+                                              <p:pRg st="9" end="9"/>
                                             </p:txEl>
                                           </p:spTgt>
                                         </p:tgtEl>

</xml_diff>